<commit_message>
update plots and ppt
</commit_message>
<xml_diff>
--- a/Colina, Casillas & Díaz HLS 2018.pptx
+++ b/Colina, Casillas & Díaz HLS 2018.pptx
@@ -5,10 +5,10 @@
     <p:sldMasterId id="2147483950" r:id="rId1"/>
   </p:sldMasterIdLst>
   <p:notesMasterIdLst>
-    <p:notesMasterId r:id="rId30"/>
+    <p:notesMasterId r:id="rId32"/>
   </p:notesMasterIdLst>
   <p:handoutMasterIdLst>
-    <p:handoutMasterId r:id="rId31"/>
+    <p:handoutMasterId r:id="rId33"/>
   </p:handoutMasterIdLst>
   <p:sldIdLst>
     <p:sldId id="256" r:id="rId2"/>
@@ -35,10 +35,12 @@
     <p:sldId id="334" r:id="rId23"/>
     <p:sldId id="335" r:id="rId24"/>
     <p:sldId id="336" r:id="rId25"/>
-    <p:sldId id="337" r:id="rId26"/>
-    <p:sldId id="338" r:id="rId27"/>
-    <p:sldId id="300" r:id="rId28"/>
-    <p:sldId id="326" r:id="rId29"/>
+    <p:sldId id="340" r:id="rId26"/>
+    <p:sldId id="337" r:id="rId27"/>
+    <p:sldId id="339" r:id="rId28"/>
+    <p:sldId id="338" r:id="rId29"/>
+    <p:sldId id="300" r:id="rId30"/>
+    <p:sldId id="326" r:id="rId31"/>
   </p:sldIdLst>
   <p:sldSz cx="9144000" cy="6858000" type="screen4x3"/>
   <p:notesSz cx="7010400" cy="9296400"/>
@@ -238,7 +240,7 @@
           <a:p>
             <a:fld id="{F7A997DC-2566-1F49-938B-F7FAC7252CD3}" type="datetimeFigureOut">
               <a:rPr lang="en-US" smtClean="0"/>
-              <a:t>10/13/18</a:t>
+              <a:t>10/18/18</a:t>
             </a:fld>
             <a:endParaRPr lang="en-US"/>
           </a:p>
@@ -403,7 +405,7 @@
           <a:p>
             <a:fld id="{52DA3CF6-9E1E-1346-B10E-CF7AE5F98066}" type="datetimeFigureOut">
               <a:rPr lang="en-US" smtClean="0"/>
-              <a:t>10/13/18</a:t>
+              <a:t>10/18/18</a:t>
             </a:fld>
             <a:endParaRPr lang="es-ES_tradnl"/>
           </a:p>
@@ -715,132 +717,132 @@
           <a:lstStyle/>
           <a:p>
             <a:r>
-              <a:rPr lang="en-US" dirty="0" smtClean="0"/>
+              <a:rPr lang="en-US" dirty="0"/>
               <a:t>The</a:t>
             </a:r>
             <a:r>
-              <a:rPr lang="en-US" baseline="0" dirty="0" smtClean="0"/>
+              <a:rPr lang="en-US" baseline="0" dirty="0"/>
               <a:t> first task examines two main questions: </a:t>
             </a:r>
           </a:p>
           <a:p>
             <a:r>
-              <a:rPr lang="en-US" baseline="0" dirty="0" smtClean="0"/>
+              <a:rPr lang="en-US" baseline="0" dirty="0"/>
               <a:t>First, how do participants syllabify the </a:t>
             </a:r>
             <a:r>
-              <a:rPr lang="en-US" baseline="0" dirty="0" err="1" smtClean="0"/>
+              <a:rPr lang="en-US" baseline="0" dirty="0" err="1"/>
               <a:t>nonse</a:t>
             </a:r>
             <a:r>
-              <a:rPr lang="en-US" baseline="0" dirty="0" smtClean="0"/>
+              <a:rPr lang="en-US" baseline="0" dirty="0"/>
               <a:t> words? Is glide-vowel-glide a possible realization?</a:t>
             </a:r>
           </a:p>
           <a:p>
             <a:r>
-              <a:rPr lang="en-US" baseline="0" dirty="0" smtClean="0"/>
+              <a:rPr lang="en-US" baseline="0" dirty="0"/>
               <a:t>Second, are responses predicted by the type of glide of the preceding consonant?</a:t>
             </a:r>
           </a:p>
           <a:p>
-            <a:endParaRPr lang="en-US" baseline="0" dirty="0" smtClean="0"/>
-          </a:p>
-          <a:p>
-            <a:r>
-              <a:rPr lang="en-US" baseline="0" dirty="0" smtClean="0"/>
+            <a:endParaRPr lang="en-US" baseline="0" dirty="0"/>
+          </a:p>
+          <a:p>
+            <a:r>
+              <a:rPr lang="en-US" baseline="0" dirty="0"/>
               <a:t>To answer these questions we coded the responses in the following manner: </a:t>
             </a:r>
           </a:p>
           <a:p>
             <a:r>
-              <a:rPr lang="en-US" baseline="0" dirty="0" smtClean="0"/>
+              <a:rPr lang="en-US" baseline="0" dirty="0"/>
               <a:t>Triphthong, Hiatus, or Simplification (can read direct from slide) </a:t>
             </a:r>
           </a:p>
           <a:p>
             <a:r>
-              <a:rPr lang="en-US" baseline="0" dirty="0" smtClean="0"/>
+              <a:rPr lang="en-US" baseline="0" dirty="0"/>
               <a:t>Explain example word “lakapiasto” for each possible realization</a:t>
             </a:r>
           </a:p>
           <a:p>
-            <a:endParaRPr lang="en-US" dirty="0" smtClean="0"/>
-          </a:p>
-          <a:p>
-            <a:r>
-              <a:rPr lang="en-US" dirty="0" smtClean="0"/>
+            <a:endParaRPr lang="en-US" dirty="0"/>
+          </a:p>
+          <a:p>
+            <a:r>
+              <a:rPr lang="en-US" dirty="0"/>
               <a:t>We fit the data using a multinomial</a:t>
             </a:r>
             <a:r>
-              <a:rPr lang="en-US" baseline="0" dirty="0" smtClean="0"/>
+              <a:rPr lang="en-US" baseline="0" dirty="0"/>
               <a:t> mixed-effects model with</a:t>
             </a:r>
           </a:p>
           <a:p>
             <a:r>
-              <a:rPr lang="en-US" b="1" baseline="0" dirty="0" smtClean="0"/>
+              <a:rPr lang="en-US" b="1" baseline="0" dirty="0"/>
               <a:t>response </a:t>
             </a:r>
             <a:r>
-              <a:rPr lang="en-US" b="0" baseline="0" dirty="0" smtClean="0"/>
+              <a:rPr lang="en-US" b="0" baseline="0" dirty="0"/>
               <a:t>as the criterion and</a:t>
             </a:r>
           </a:p>
           <a:p>
             <a:r>
-              <a:rPr lang="en-US" b="1" baseline="0" dirty="0" smtClean="0"/>
+              <a:rPr lang="en-US" b="1" baseline="0" dirty="0"/>
               <a:t>Glide type </a:t>
             </a:r>
             <a:r>
-              <a:rPr lang="en-US" b="0" baseline="0" dirty="0" smtClean="0"/>
+              <a:rPr lang="en-US" b="0" baseline="0" dirty="0"/>
               <a:t>and </a:t>
             </a:r>
             <a:r>
-              <a:rPr lang="en-US" b="1" baseline="0" dirty="0" smtClean="0"/>
+              <a:rPr lang="en-US" b="1" baseline="0" dirty="0"/>
               <a:t>preceding consonant</a:t>
             </a:r>
             <a:r>
-              <a:rPr lang="en-US" b="0" baseline="0" dirty="0" smtClean="0"/>
+              <a:rPr lang="en-US" b="0" baseline="0" dirty="0"/>
               <a:t> as fixed effects</a:t>
             </a:r>
           </a:p>
           <a:p>
             <a:r>
-              <a:rPr lang="en-US" b="0" baseline="0" dirty="0" smtClean="0"/>
+              <a:rPr lang="en-US" b="0" baseline="0" dirty="0"/>
               <a:t>The model included by-subjects and by-items intercepts with random </a:t>
             </a:r>
           </a:p>
           <a:p>
             <a:r>
-              <a:rPr lang="en-US" b="0" baseline="0" dirty="0" smtClean="0"/>
+              <a:rPr lang="en-US" b="0" baseline="0" dirty="0"/>
               <a:t>slopes for glide_type and preceding consonant</a:t>
             </a:r>
           </a:p>
           <a:p>
-            <a:endParaRPr lang="en-US" b="1" dirty="0" smtClean="0"/>
-          </a:p>
-          <a:p>
-            <a:r>
-              <a:rPr lang="en-US" dirty="0" smtClean="0"/>
+            <a:endParaRPr lang="en-US" b="1" dirty="0"/>
+          </a:p>
+          <a:p>
+            <a:r>
+              <a:rPr lang="en-US" dirty="0"/>
               <a:t>The</a:t>
             </a:r>
             <a:r>
-              <a:rPr lang="en-US" baseline="0" dirty="0" smtClean="0"/>
+              <a:rPr lang="en-US" baseline="0" dirty="0"/>
               <a:t> m</a:t>
             </a:r>
             <a:r>
-              <a:rPr lang="en-US" dirty="0" smtClean="0"/>
+              <a:rPr lang="en-US" dirty="0"/>
               <a:t>odel found that responses did not vary as a function of the </a:t>
             </a:r>
             <a:r>
-              <a:rPr lang="en-US" baseline="0" dirty="0" smtClean="0"/>
+              <a:rPr lang="en-US" baseline="0" dirty="0"/>
               <a:t>glide type </a:t>
             </a:r>
           </a:p>
           <a:p>
             <a:r>
-              <a:rPr lang="en-US" baseline="0" dirty="0" smtClean="0"/>
+              <a:rPr lang="en-US" baseline="0" dirty="0"/>
               <a:t>nor the preceding consonant, so we will look at overall response rates</a:t>
             </a:r>
             <a:endParaRPr lang="en-US" dirty="0"/>
@@ -874,6 +876,221 @@
     <p:extLst>
       <p:ext uri="{BB962C8B-B14F-4D97-AF65-F5344CB8AC3E}">
         <p14:creationId xmlns:p14="http://schemas.microsoft.com/office/powerpoint/2010/main" val="893800227"/>
+      </p:ext>
+    </p:extLst>
+  </p:cSld>
+  <p:clrMapOvr>
+    <a:masterClrMapping/>
+  </p:clrMapOvr>
+</p:notes>
+</file>
+
+<file path=ppt/notesSlides/notesSlide10.xml><?xml version="1.0" encoding="utf-8"?>
+<p:notes xmlns:a="http://schemas.openxmlformats.org/drawingml/2006/main" xmlns:r="http://schemas.openxmlformats.org/officeDocument/2006/relationships" xmlns:p="http://schemas.openxmlformats.org/presentationml/2006/main">
+  <p:cSld>
+    <p:spTree>
+      <p:nvGrpSpPr>
+        <p:cNvPr id="1" name=""/>
+        <p:cNvGrpSpPr/>
+        <p:nvPr/>
+      </p:nvGrpSpPr>
+      <p:grpSpPr>
+        <a:xfrm>
+          <a:off x="0" y="0"/>
+          <a:ext cx="0" cy="0"/>
+          <a:chOff x="0" y="0"/>
+          <a:chExt cx="0" cy="0"/>
+        </a:xfrm>
+      </p:grpSpPr>
+      <p:sp>
+        <p:nvSpPr>
+          <p:cNvPr id="2" name="Slide Image Placeholder 1"/>
+          <p:cNvSpPr>
+            <a:spLocks noGrp="1" noRot="1" noChangeAspect="1"/>
+          </p:cNvSpPr>
+          <p:nvPr>
+            <p:ph type="sldImg"/>
+          </p:nvPr>
+        </p:nvSpPr>
+        <p:spPr/>
+      </p:sp>
+      <p:sp>
+        <p:nvSpPr>
+          <p:cNvPr id="3" name="Notes Placeholder 2"/>
+          <p:cNvSpPr>
+            <a:spLocks noGrp="1"/>
+          </p:cNvSpPr>
+          <p:nvPr>
+            <p:ph type="body" idx="1"/>
+          </p:nvPr>
+        </p:nvSpPr>
+        <p:spPr/>
+        <p:txBody>
+          <a:bodyPr/>
+          <a:lstStyle/>
+          <a:p>
+            <a:endParaRPr lang="en-US" dirty="0"/>
+          </a:p>
+        </p:txBody>
+      </p:sp>
+      <p:sp>
+        <p:nvSpPr>
+          <p:cNvPr id="4" name="Slide Number Placeholder 3"/>
+          <p:cNvSpPr>
+            <a:spLocks noGrp="1"/>
+          </p:cNvSpPr>
+          <p:nvPr>
+            <p:ph type="sldNum" sz="quarter" idx="5"/>
+          </p:nvPr>
+        </p:nvSpPr>
+        <p:spPr/>
+        <p:txBody>
+          <a:bodyPr/>
+          <a:lstStyle/>
+          <a:p>
+            <a:fld id="{6B84B913-0650-8A41-A4F4-F9FEF2C621A4}" type="slidenum">
+              <a:rPr lang="es-ES_tradnl" smtClean="0"/>
+              <a:t>27</a:t>
+            </a:fld>
+            <a:endParaRPr lang="es-ES_tradnl"/>
+          </a:p>
+        </p:txBody>
+      </p:sp>
+    </p:spTree>
+    <p:extLst>
+      <p:ext uri="{BB962C8B-B14F-4D97-AF65-F5344CB8AC3E}">
+        <p14:creationId xmlns:p14="http://schemas.microsoft.com/office/powerpoint/2010/main" val="888253624"/>
+      </p:ext>
+    </p:extLst>
+  </p:cSld>
+  <p:clrMapOvr>
+    <a:masterClrMapping/>
+  </p:clrMapOvr>
+</p:notes>
+</file>
+
+<file path=ppt/notesSlides/notesSlide11.xml><?xml version="1.0" encoding="utf-8"?>
+<p:notes xmlns:a="http://schemas.openxmlformats.org/drawingml/2006/main" xmlns:r="http://schemas.openxmlformats.org/officeDocument/2006/relationships" xmlns:p="http://schemas.openxmlformats.org/presentationml/2006/main">
+  <p:cSld>
+    <p:spTree>
+      <p:nvGrpSpPr>
+        <p:cNvPr id="1" name=""/>
+        <p:cNvGrpSpPr/>
+        <p:nvPr/>
+      </p:nvGrpSpPr>
+      <p:grpSpPr>
+        <a:xfrm>
+          <a:off x="0" y="0"/>
+          <a:ext cx="0" cy="0"/>
+          <a:chOff x="0" y="0"/>
+          <a:chExt cx="0" cy="0"/>
+        </a:xfrm>
+      </p:grpSpPr>
+      <p:sp>
+        <p:nvSpPr>
+          <p:cNvPr id="2" name="Slide Image Placeholder 1"/>
+          <p:cNvSpPr>
+            <a:spLocks noGrp="1" noRot="1" noChangeAspect="1"/>
+          </p:cNvSpPr>
+          <p:nvPr>
+            <p:ph type="sldImg"/>
+          </p:nvPr>
+        </p:nvSpPr>
+        <p:spPr/>
+      </p:sp>
+      <p:sp>
+        <p:nvSpPr>
+          <p:cNvPr id="3" name="Notes Placeholder 2"/>
+          <p:cNvSpPr>
+            <a:spLocks noGrp="1"/>
+          </p:cNvSpPr>
+          <p:nvPr>
+            <p:ph type="body" idx="1"/>
+          </p:nvPr>
+        </p:nvSpPr>
+        <p:spPr/>
+        <p:txBody>
+          <a:bodyPr/>
+          <a:lstStyle/>
+          <a:p>
+            <a:r>
+              <a:rPr lang="en-US" dirty="0"/>
+              <a:t>EXTRA</a:t>
+            </a:r>
+          </a:p>
+          <a:p>
+            <a:endParaRPr lang="en-US" dirty="0"/>
+          </a:p>
+          <a:p>
+            <a:r>
+              <a:rPr lang="en-US" dirty="0"/>
+              <a:t>Plot: syllabification</a:t>
+            </a:r>
+            <a:r>
+              <a:rPr lang="en-US" baseline="0" dirty="0"/>
+              <a:t> responses by POA, voicing, and glide type</a:t>
+            </a:r>
+          </a:p>
+          <a:p>
+            <a:r>
+              <a:rPr lang="en-US" baseline="0" dirty="0" err="1"/>
+              <a:t>Frontness</a:t>
+            </a:r>
+            <a:r>
+              <a:rPr lang="en-US" baseline="0" dirty="0"/>
+              <a:t> doesn’t matter (j is not different from w)</a:t>
+            </a:r>
+          </a:p>
+          <a:p>
+            <a:r>
+              <a:rPr lang="en-US" baseline="0" dirty="0"/>
+              <a:t>The preceding consonant doesn’t matter (though </a:t>
+            </a:r>
+            <a:r>
+              <a:rPr lang="en-US" baseline="0"/>
+              <a:t>not easy </a:t>
+            </a:r>
+            <a:r>
+              <a:rPr lang="en-US" baseline="0" dirty="0"/>
+              <a:t>to see here)</a:t>
+            </a:r>
+          </a:p>
+          <a:p>
+            <a:r>
+              <a:rPr lang="en-US" baseline="0" dirty="0"/>
+              <a:t>Take away: the responses are pretty equally spread out</a:t>
+            </a:r>
+            <a:endParaRPr lang="en-US" dirty="0"/>
+          </a:p>
+        </p:txBody>
+      </p:sp>
+      <p:sp>
+        <p:nvSpPr>
+          <p:cNvPr id="4" name="Slide Number Placeholder 3"/>
+          <p:cNvSpPr>
+            <a:spLocks noGrp="1"/>
+          </p:cNvSpPr>
+          <p:nvPr>
+            <p:ph type="sldNum" sz="quarter" idx="10"/>
+          </p:nvPr>
+        </p:nvSpPr>
+        <p:spPr/>
+        <p:txBody>
+          <a:bodyPr/>
+          <a:lstStyle/>
+          <a:p>
+            <a:fld id="{6B84B913-0650-8A41-A4F4-F9FEF2C621A4}" type="slidenum">
+              <a:rPr lang="es-ES_tradnl" smtClean="0"/>
+              <a:t>30</a:t>
+            </a:fld>
+            <a:endParaRPr lang="es-ES_tradnl"/>
+          </a:p>
+        </p:txBody>
+      </p:sp>
+    </p:spTree>
+    <p:extLst>
+      <p:ext uri="{BB962C8B-B14F-4D97-AF65-F5344CB8AC3E}">
+        <p14:creationId xmlns:p14="http://schemas.microsoft.com/office/powerpoint/2010/main" val="1064530980"/>
       </p:ext>
     </p:extLst>
   </p:cSld>
@@ -928,11 +1145,11 @@
           <a:lstStyle/>
           <a:p>
             <a:r>
-              <a:rPr lang="en-US" dirty="0" smtClean="0"/>
+              <a:rPr lang="en-US" dirty="0"/>
               <a:t>Plot: </a:t>
             </a:r>
             <a:r>
-              <a:rPr lang="en-US" sz="1200" b="0" i="0" kern="1200" dirty="0" smtClean="0">
+              <a:rPr lang="en-US" sz="1200" b="0" i="0" kern="1200" dirty="0">
                 <a:solidFill>
                   <a:schemeClr val="tx1"/>
                 </a:solidFill>
@@ -946,7 +1163,7 @@
           </a:p>
           <a:p>
             <a:r>
-              <a:rPr lang="en-US" sz="1200" b="0" i="0" kern="1200" dirty="0" smtClean="0">
+              <a:rPr lang="en-US" sz="1200" b="0" i="0" kern="1200" dirty="0">
                 <a:solidFill>
                   <a:schemeClr val="tx1"/>
                 </a:solidFill>
@@ -958,7 +1175,7 @@
               <a:t>We observe that </a:t>
             </a:r>
             <a:r>
-              <a:rPr lang="en-US" sz="1200" b="0" i="0" kern="1200" dirty="0" err="1" smtClean="0">
+              <a:rPr lang="en-US" sz="1200" b="0" i="0" kern="1200" dirty="0" err="1">
                 <a:solidFill>
                   <a:schemeClr val="tx1"/>
                 </a:solidFill>
@@ -970,7 +1187,7 @@
               <a:t>triphthongs</a:t>
             </a:r>
             <a:r>
-              <a:rPr lang="en-US" sz="1200" b="0" i="0" kern="1200" dirty="0" smtClean="0">
+              <a:rPr lang="en-US" sz="1200" b="0" i="0" kern="1200" dirty="0">
                 <a:solidFill>
                   <a:schemeClr val="tx1"/>
                 </a:solidFill>
@@ -984,7 +1201,7 @@
           </a:p>
           <a:p>
             <a:r>
-              <a:rPr lang="en-US" sz="1200" b="0" i="0" kern="1200" dirty="0" smtClean="0">
+              <a:rPr lang="en-US" sz="1200" b="0" i="0" kern="1200" dirty="0">
                 <a:solidFill>
                   <a:schemeClr val="tx1"/>
                 </a:solidFill>
@@ -1080,11 +1297,11 @@
           <a:lstStyle/>
           <a:p>
             <a:r>
-              <a:rPr lang="en-US" dirty="0" smtClean="0"/>
+              <a:rPr lang="en-US" dirty="0"/>
               <a:t>Plot: </a:t>
             </a:r>
             <a:r>
-              <a:rPr lang="en-US" sz="1200" b="0" i="0" kern="1200" dirty="0" smtClean="0">
+              <a:rPr lang="en-US" sz="1200" b="0" i="0" kern="1200" dirty="0">
                 <a:solidFill>
                   <a:schemeClr val="tx1"/>
                 </a:solidFill>
@@ -1098,7 +1315,7 @@
           </a:p>
           <a:p>
             <a:r>
-              <a:rPr lang="en-US" sz="1200" b="0" i="0" kern="1200" dirty="0" smtClean="0">
+              <a:rPr lang="en-US" sz="1200" b="0" i="0" kern="1200" dirty="0">
                 <a:solidFill>
                   <a:schemeClr val="tx1"/>
                 </a:solidFill>
@@ -1112,11 +1329,11 @@
           </a:p>
           <a:p>
             <a:r>
-              <a:rPr lang="en-US" dirty="0" smtClean="0"/>
+              <a:rPr lang="en-US" dirty="0"/>
               <a:t/>
             </a:r>
             <a:br>
-              <a:rPr lang="en-US" dirty="0" smtClean="0"/>
+              <a:rPr lang="en-US" dirty="0"/>
             </a:br>
             <a:endParaRPr lang="en-US" dirty="0"/>
           </a:p>
@@ -1203,34 +1420,34 @@
           <a:lstStyle/>
           <a:p>
             <a:r>
-              <a:rPr lang="en-US" dirty="0" smtClean="0"/>
+              <a:rPr lang="en-US" dirty="0"/>
               <a:t>Main finding: we have evidence supporting the hypothesis that pre-vocalic glides can be part of the onset</a:t>
             </a:r>
           </a:p>
           <a:p>
             <a:r>
-              <a:rPr lang="en-US" dirty="0" smtClean="0"/>
+              <a:rPr lang="en-US" dirty="0"/>
               <a:t>Why: because the participants produced </a:t>
             </a:r>
             <a:r>
-              <a:rPr lang="en-US" dirty="0" err="1" smtClean="0"/>
+              <a:rPr lang="en-US" dirty="0" err="1"/>
               <a:t>triphthongs</a:t>
             </a:r>
             <a:r>
-              <a:rPr lang="en-US" dirty="0" smtClean="0"/>
+              <a:rPr lang="en-US" dirty="0"/>
               <a:t> at least some of the time. </a:t>
             </a:r>
           </a:p>
           <a:p>
-            <a:endParaRPr lang="en-US" dirty="0" smtClean="0"/>
-          </a:p>
-          <a:p>
-            <a:r>
-              <a:rPr lang="en-US" dirty="0" smtClean="0"/>
+            <a:endParaRPr lang="en-US" dirty="0"/>
+          </a:p>
+          <a:p>
+            <a:r>
+              <a:rPr lang="en-US" dirty="0"/>
               <a:t>Responses were</a:t>
             </a:r>
             <a:r>
-              <a:rPr lang="en-US" baseline="0" dirty="0" smtClean="0"/>
+              <a:rPr lang="en-US" baseline="0" dirty="0"/>
               <a:t> variable and we cannot account for this variability with glide type nor preceding consonant</a:t>
             </a:r>
             <a:endParaRPr lang="en-US" dirty="0"/>
@@ -1318,16 +1535,16 @@
           <a:lstStyle/>
           <a:p>
             <a:r>
-              <a:rPr lang="en-US" dirty="0" smtClean="0"/>
+              <a:rPr lang="en-US" dirty="0"/>
               <a:t>This plot shows duration as a function of preceding consonant (palatal vs. non-palatal). </a:t>
             </a:r>
           </a:p>
           <a:p>
-            <a:endParaRPr lang="en-US" dirty="0" smtClean="0"/>
-          </a:p>
-          <a:p>
-            <a:r>
-              <a:rPr lang="en-US" sz="1200" b="0" i="0" kern="1200" dirty="0" smtClean="0">
+            <a:endParaRPr lang="en-US" dirty="0"/>
+          </a:p>
+          <a:p>
+            <a:r>
+              <a:rPr lang="en-US" sz="1200" b="0" i="0" kern="1200" dirty="0">
                 <a:solidFill>
                   <a:schemeClr val="tx1"/>
                 </a:solidFill>
@@ -1339,33 +1556,33 @@
               <a:t>We see a longer duration for glide segments following a palatal consonant</a:t>
             </a:r>
             <a:r>
-              <a:rPr lang="en-US" baseline="0" dirty="0" smtClean="0"/>
+              <a:rPr lang="en-US" baseline="0" dirty="0"/>
               <a:t> (roughly 30 </a:t>
             </a:r>
             <a:r>
-              <a:rPr lang="en-US" baseline="0" dirty="0" err="1" smtClean="0"/>
+              <a:rPr lang="en-US" baseline="0" dirty="0" err="1"/>
               <a:t>ms</a:t>
             </a:r>
             <a:r>
-              <a:rPr lang="en-US" baseline="0" dirty="0" smtClean="0"/>
+              <a:rPr lang="en-US" baseline="0" dirty="0"/>
               <a:t> longer)</a:t>
             </a:r>
           </a:p>
           <a:p>
-            <a:endParaRPr lang="en-US" baseline="0" dirty="0" smtClean="0"/>
-          </a:p>
-          <a:p>
-            <a:r>
-              <a:rPr lang="en-US" baseline="0" dirty="0" smtClean="0"/>
+            <a:endParaRPr lang="en-US" baseline="0" dirty="0"/>
+          </a:p>
+          <a:p>
+            <a:r>
+              <a:rPr lang="en-US" baseline="0" dirty="0"/>
               <a:t>Not expected (intuitively, if glide is blocked, one might expect a shorter duration, at least I did)</a:t>
             </a:r>
           </a:p>
           <a:p>
-            <a:endParaRPr lang="en-US" baseline="0" dirty="0" smtClean="0"/>
-          </a:p>
-          <a:p>
-            <a:r>
-              <a:rPr lang="en-US" baseline="0" dirty="0" smtClean="0"/>
+            <a:endParaRPr lang="en-US" baseline="0" dirty="0"/>
+          </a:p>
+          <a:p>
+            <a:r>
+              <a:rPr lang="en-US" baseline="0" dirty="0"/>
               <a:t>Two possible explanations: </a:t>
             </a:r>
           </a:p>
@@ -1374,7 +1591,7 @@
               <a:buAutoNum type="arabicParenR"/>
             </a:pPr>
             <a:r>
-              <a:rPr lang="en-US" sz="1200" b="0" i="0" kern="1200" dirty="0" smtClean="0">
+              <a:rPr lang="en-US" sz="1200" b="0" i="0" kern="1200" dirty="0">
                 <a:solidFill>
                   <a:schemeClr val="tx1"/>
                 </a:solidFill>
@@ -1391,7 +1608,7 @@
               <a:buNone/>
             </a:pPr>
             <a:r>
-              <a:rPr lang="en-US" sz="1200" b="0" i="0" kern="1200" dirty="0" smtClean="0">
+              <a:rPr lang="en-US" sz="1200" b="0" i="0" kern="1200" dirty="0">
                 <a:solidFill>
                   <a:schemeClr val="tx1"/>
                 </a:solidFill>
@@ -1403,7 +1620,7 @@
               <a:t>     the preceding consonant is not palatal (i.e., '</a:t>
             </a:r>
             <a:r>
-              <a:rPr lang="en-US" sz="1200" b="0" i="0" kern="1200" dirty="0" err="1" smtClean="0">
+              <a:rPr lang="en-US" sz="1200" b="0" i="0" kern="1200" dirty="0" err="1">
                 <a:solidFill>
                   <a:schemeClr val="tx1"/>
                 </a:solidFill>
@@ -1415,7 +1632,7 @@
               <a:t>ch</a:t>
             </a:r>
             <a:r>
-              <a:rPr lang="en-US" sz="1200" b="0" i="0" kern="1200" dirty="0" smtClean="0">
+              <a:rPr lang="en-US" sz="1200" b="0" i="0" kern="1200" dirty="0">
                 <a:solidFill>
                   <a:schemeClr val="tx1"/>
                 </a:solidFill>
@@ -1427,7 +1644,7 @@
               <a:t>' is surfacing as [</a:t>
             </a:r>
             <a:r>
-              <a:rPr lang="en-US" sz="1200" b="0" i="0" kern="1200" dirty="0" err="1" smtClean="0">
+              <a:rPr lang="en-US" sz="1200" b="0" i="0" kern="1200" dirty="0" err="1">
                 <a:solidFill>
                   <a:schemeClr val="tx1"/>
                 </a:solidFill>
@@ -1439,7 +1656,7 @@
               <a:t>ʃ</a:t>
             </a:r>
             <a:r>
-              <a:rPr lang="en-US" sz="1200" b="0" i="0" kern="1200" dirty="0" smtClean="0">
+              <a:rPr lang="en-US" sz="1200" b="0" i="0" kern="1200" dirty="0">
                 <a:solidFill>
                   <a:schemeClr val="tx1"/>
                 </a:solidFill>
@@ -1456,7 +1673,7 @@
               <a:buNone/>
             </a:pPr>
             <a:r>
-              <a:rPr lang="en-US" sz="1200" b="0" i="0" kern="1200" dirty="0" smtClean="0">
+              <a:rPr lang="en-US" sz="1200" b="0" i="0" kern="1200" dirty="0">
                 <a:solidFill>
                   <a:schemeClr val="tx1"/>
                 </a:solidFill>
@@ -1468,7 +1685,7 @@
               <a:t>     </a:t>
             </a:r>
             <a:r>
-              <a:rPr lang="en-US" sz="1200" b="0" i="0" kern="1200" dirty="0" err="1" smtClean="0">
+              <a:rPr lang="en-US" sz="1200" b="0" i="0" kern="1200" dirty="0" err="1">
                 <a:solidFill>
                   <a:schemeClr val="tx1"/>
                 </a:solidFill>
@@ -1480,7 +1697,7 @@
               <a:t>alveo</a:t>
             </a:r>
             <a:r>
-              <a:rPr lang="en-US" sz="1200" b="0" i="0" kern="1200" dirty="0" smtClean="0">
+              <a:rPr lang="en-US" sz="1200" b="0" i="0" kern="1200" dirty="0">
                 <a:solidFill>
                   <a:schemeClr val="tx1"/>
                 </a:solidFill>
@@ -1497,7 +1714,7 @@
               <a:buNone/>
             </a:pPr>
             <a:r>
-              <a:rPr lang="en-US" sz="1200" b="0" i="0" kern="1200" dirty="0" smtClean="0">
+              <a:rPr lang="en-US" sz="1200" b="0" i="0" kern="1200" dirty="0">
                 <a:solidFill>
                   <a:schemeClr val="tx1"/>
                 </a:solidFill>
@@ -1593,7 +1810,7 @@
           <a:lstStyle/>
           <a:p>
             <a:r>
-              <a:rPr lang="en-US" sz="1200" b="0" i="0" kern="1200" dirty="0" smtClean="0">
+              <a:rPr lang="en-US" sz="1200" b="0" i="0" kern="1200" dirty="0">
                 <a:solidFill>
                   <a:schemeClr val="tx1"/>
                 </a:solidFill>
@@ -1607,7 +1824,7 @@
           </a:p>
           <a:p>
             <a:r>
-              <a:rPr lang="en-US" sz="1200" b="0" i="0" kern="1200" dirty="0" smtClean="0">
+              <a:rPr lang="en-US" sz="1200" b="0" i="0" kern="1200" dirty="0">
                 <a:solidFill>
                   <a:schemeClr val="tx1"/>
                 </a:solidFill>
@@ -1620,7 +1837,7 @@
             </a:r>
           </a:p>
           <a:p>
-            <a:endParaRPr lang="en-US" sz="1200" b="0" i="0" kern="1200" dirty="0" smtClean="0">
+            <a:endParaRPr lang="en-US" sz="1200" b="0" i="0" kern="1200" dirty="0">
               <a:solidFill>
                 <a:schemeClr val="tx1"/>
               </a:solidFill>
@@ -1632,7 +1849,7 @@
           </a:p>
           <a:p>
             <a:r>
-              <a:rPr lang="en-US" sz="1200" b="0" i="0" kern="1200" dirty="0" smtClean="0">
+              <a:rPr lang="en-US" sz="1200" b="0" i="0" kern="1200" dirty="0">
                 <a:solidFill>
                   <a:schemeClr val="tx1"/>
                 </a:solidFill>
@@ -1646,7 +1863,7 @@
           </a:p>
           <a:p>
             <a:r>
-              <a:rPr lang="en-US" sz="1200" b="0" i="0" kern="1200" dirty="0" smtClean="0">
+              <a:rPr lang="en-US" sz="1200" b="0" i="0" kern="1200" dirty="0">
                 <a:solidFill>
                   <a:schemeClr val="tx1"/>
                 </a:solidFill>
@@ -1742,49 +1959,49 @@
           <a:lstStyle/>
           <a:p>
             <a:r>
-              <a:rPr lang="en-US" dirty="0" smtClean="0"/>
+              <a:rPr lang="en-US" dirty="0"/>
               <a:t>No effect of preceding consonant: </a:t>
             </a:r>
           </a:p>
           <a:p>
             <a:r>
-              <a:rPr lang="en-US" dirty="0" err="1" smtClean="0"/>
+              <a:rPr lang="en-US" dirty="0" err="1"/>
               <a:t>Df</a:t>
             </a:r>
             <a:r>
-              <a:rPr lang="en-US" dirty="0" smtClean="0"/>
+              <a:rPr lang="en-US" dirty="0"/>
               <a:t> = 3, p = 0.260</a:t>
             </a:r>
           </a:p>
           <a:p>
-            <a:endParaRPr lang="en-US" dirty="0" smtClean="0"/>
-          </a:p>
-          <a:p>
-            <a:r>
-              <a:rPr lang="en-US" dirty="0" smtClean="0"/>
+            <a:endParaRPr lang="en-US" dirty="0"/>
+          </a:p>
+          <a:p>
+            <a:r>
+              <a:rPr lang="en-US" dirty="0"/>
               <a:t>F1 movement minimal</a:t>
             </a:r>
             <a:r>
-              <a:rPr lang="en-US" baseline="0" dirty="0" smtClean="0"/>
+              <a:rPr lang="en-US" baseline="0" dirty="0"/>
               <a:t> and </a:t>
             </a:r>
             <a:r>
-              <a:rPr lang="en-US" dirty="0" smtClean="0"/>
+              <a:rPr lang="en-US" dirty="0"/>
               <a:t>similar across contexts. </a:t>
             </a:r>
           </a:p>
           <a:p>
             <a:r>
-              <a:rPr lang="en-US" dirty="0" smtClean="0"/>
+              <a:rPr lang="en-US" dirty="0"/>
               <a:t>Likely</a:t>
             </a:r>
             <a:r>
-              <a:rPr lang="en-US" baseline="0" dirty="0" smtClean="0"/>
+              <a:rPr lang="en-US" baseline="0" dirty="0"/>
               <a:t> aren’t producing glides</a:t>
             </a:r>
           </a:p>
           <a:p>
-            <a:endParaRPr lang="en-US" baseline="0" dirty="0" smtClean="0"/>
+            <a:endParaRPr lang="en-US" baseline="0" dirty="0"/>
           </a:p>
           <a:p>
             <a:endParaRPr lang="en-US" dirty="0"/>
@@ -1872,20 +2089,20 @@
           <a:lstStyle/>
           <a:p>
             <a:r>
-              <a:rPr lang="en-US" dirty="0" smtClean="0"/>
+              <a:rPr lang="en-US" dirty="0"/>
               <a:t>Intensity is different</a:t>
             </a:r>
             <a:r>
-              <a:rPr lang="en-US" baseline="0" dirty="0" smtClean="0"/>
+              <a:rPr lang="en-US" baseline="0" dirty="0"/>
               <a:t> for palatal vs. non-palatal preceding consonants after 35% of the time course</a:t>
             </a:r>
           </a:p>
           <a:p>
-            <a:endParaRPr lang="en-US" baseline="0" dirty="0" smtClean="0"/>
-          </a:p>
-          <a:p>
-            <a:r>
-              <a:rPr lang="en-US" baseline="0" dirty="0" smtClean="0"/>
+            <a:endParaRPr lang="en-US" baseline="0" dirty="0"/>
+          </a:p>
+          <a:p>
+            <a:r>
+              <a:rPr lang="en-US" baseline="0" dirty="0"/>
               <a:t>The productions are more consonant like (lower intensity) after the palatal</a:t>
             </a:r>
             <a:endParaRPr lang="en-US" dirty="0"/>
@@ -1972,53 +2189,6 @@
           <a:bodyPr/>
           <a:lstStyle/>
           <a:p>
-            <a:r>
-              <a:rPr lang="en-US" dirty="0" smtClean="0"/>
-              <a:t>EXTRA</a:t>
-            </a:r>
-          </a:p>
-          <a:p>
-            <a:endParaRPr lang="en-US" dirty="0" smtClean="0"/>
-          </a:p>
-          <a:p>
-            <a:r>
-              <a:rPr lang="en-US" dirty="0" smtClean="0"/>
-              <a:t>Plot: syllabification</a:t>
-            </a:r>
-            <a:r>
-              <a:rPr lang="en-US" baseline="0" dirty="0" smtClean="0"/>
-              <a:t> responses by POA, voicing, and glide type</a:t>
-            </a:r>
-          </a:p>
-          <a:p>
-            <a:r>
-              <a:rPr lang="en-US" baseline="0" dirty="0" err="1" smtClean="0"/>
-              <a:t>Frontness</a:t>
-            </a:r>
-            <a:r>
-              <a:rPr lang="en-US" baseline="0" dirty="0" smtClean="0"/>
-              <a:t> doesn’t matter (j is not different from w)</a:t>
-            </a:r>
-          </a:p>
-          <a:p>
-            <a:r>
-              <a:rPr lang="en-US" baseline="0" dirty="0" smtClean="0"/>
-              <a:t>The preceding consonant doesn’t matter (though </a:t>
-            </a:r>
-            <a:r>
-              <a:rPr lang="en-US" baseline="0" smtClean="0"/>
-              <a:t>not easy </a:t>
-            </a:r>
-            <a:r>
-              <a:rPr lang="en-US" baseline="0" dirty="0" smtClean="0"/>
-              <a:t>to see here)</a:t>
-            </a:r>
-          </a:p>
-          <a:p>
-            <a:r>
-              <a:rPr lang="en-US" baseline="0" dirty="0" smtClean="0"/>
-              <a:t>Take away: the responses are pretty equally spread out</a:t>
-            </a:r>
             <a:endParaRPr lang="en-US" dirty="0"/>
           </a:p>
         </p:txBody>
@@ -2030,7 +2200,7 @@
             <a:spLocks noGrp="1"/>
           </p:cNvSpPr>
           <p:nvPr>
-            <p:ph type="sldNum" sz="quarter" idx="10"/>
+            <p:ph type="sldNum" sz="quarter" idx="5"/>
           </p:nvPr>
         </p:nvSpPr>
         <p:spPr/>
@@ -2040,7 +2210,7 @@
           <a:p>
             <a:fld id="{6B84B913-0650-8A41-A4F4-F9FEF2C621A4}" type="slidenum">
               <a:rPr lang="es-ES_tradnl" smtClean="0"/>
-              <a:t>28</a:t>
+              <a:t>26</a:t>
             </a:fld>
             <a:endParaRPr lang="es-ES_tradnl"/>
           </a:p>
@@ -2049,7 +2219,7 @@
     </p:spTree>
     <p:extLst>
       <p:ext uri="{BB962C8B-B14F-4D97-AF65-F5344CB8AC3E}">
-        <p14:creationId xmlns:p14="http://schemas.microsoft.com/office/powerpoint/2010/main" val="1064530980"/>
+        <p14:creationId xmlns:p14="http://schemas.microsoft.com/office/powerpoint/2010/main" val="1181522963"/>
       </p:ext>
     </p:extLst>
   </p:cSld>
@@ -2254,7 +2424,7 @@
             <a:fld id="{04AF466F-BDA4-4F18-9C7B-FF0A9A1B0E80}" type="datetime1">
               <a:rPr lang="en-US" smtClean="0"/>
               <a:pPr/>
-              <a:t>10/13/18</a:t>
+              <a:t>10/18/18</a:t>
             </a:fld>
             <a:endParaRPr lang="en-US"/>
           </a:p>
@@ -2421,7 +2591,7 @@
             <a:fld id="{58FB4290-6522-4139-852E-05BD9E7F0D2E}" type="datetime1">
               <a:rPr lang="en-US" smtClean="0"/>
               <a:pPr/>
-              <a:t>10/13/18</a:t>
+              <a:t>10/18/18</a:t>
             </a:fld>
             <a:endParaRPr lang="en-US"/>
           </a:p>
@@ -2598,7 +2768,7 @@
             <a:fld id="{AAB955F9-81EA-47C5-8059-9E5C2B437C70}" type="datetime1">
               <a:rPr lang="en-US" smtClean="0"/>
               <a:pPr/>
-              <a:t>10/13/18</a:t>
+              <a:t>10/18/18</a:t>
             </a:fld>
             <a:endParaRPr lang="en-US"/>
           </a:p>
@@ -2765,7 +2935,7 @@
             <a:fld id="{1CEF607B-A47E-422C-9BEF-122CCDB7C526}" type="datetime1">
               <a:rPr lang="en-US" smtClean="0"/>
               <a:pPr/>
-              <a:t>10/13/18</a:t>
+              <a:t>10/18/18</a:t>
             </a:fld>
             <a:endParaRPr lang="en-US"/>
           </a:p>
@@ -3008,7 +3178,7 @@
             <a:fld id="{63A9A7CB-BEE6-4F99-898E-913F06E8E125}" type="datetime1">
               <a:rPr lang="en-US" smtClean="0"/>
               <a:pPr/>
-              <a:t>10/13/18</a:t>
+              <a:t>10/18/18</a:t>
             </a:fld>
             <a:endParaRPr lang="en-US"/>
           </a:p>
@@ -3293,7 +3463,7 @@
             <a:fld id="{B6EE300C-6FC5-4FC3-AF1A-075E4F50620D}" type="datetime1">
               <a:rPr lang="en-US" smtClean="0"/>
               <a:pPr/>
-              <a:t>10/13/18</a:t>
+              <a:t>10/18/18</a:t>
             </a:fld>
             <a:endParaRPr lang="en-US"/>
           </a:p>
@@ -3724,7 +3894,7 @@
             <a:fld id="{F50D295D-4A77-4DEB-B04C-9F4282A8BC04}" type="datetime1">
               <a:rPr lang="en-US" smtClean="0"/>
               <a:pPr/>
-              <a:t>10/13/18</a:t>
+              <a:t>10/18/18</a:t>
             </a:fld>
             <a:endParaRPr lang="en-US"/>
           </a:p>
@@ -3839,7 +4009,7 @@
             <a:fld id="{02B28685-4D0C-42D5-8013-B5904CD1FCBC}" type="datetime1">
               <a:rPr lang="en-US" smtClean="0"/>
               <a:pPr/>
-              <a:t>10/13/18</a:t>
+              <a:t>10/18/18</a:t>
             </a:fld>
             <a:endParaRPr lang="en-US"/>
           </a:p>
@@ -3931,7 +4101,7 @@
             <a:fld id="{FDF226C0-9885-4BA9-BBFA-A52CBFEBB775}" type="datetime1">
               <a:rPr lang="en-US" smtClean="0"/>
               <a:pPr/>
-              <a:t>10/13/18</a:t>
+              <a:t>10/18/18</a:t>
             </a:fld>
             <a:endParaRPr lang="en-US"/>
           </a:p>
@@ -4122,7 +4292,7 @@
             <a:fld id="{EBEE1B38-C5EB-4D66-9137-0AFE9CDEDE8F}" type="datetime1">
               <a:rPr lang="en-US" smtClean="0"/>
               <a:pPr/>
-              <a:t>10/13/18</a:t>
+              <a:t>10/18/18</a:t>
             </a:fld>
             <a:endParaRPr lang="en-US"/>
           </a:p>
@@ -4442,7 +4612,7 @@
             <a:fld id="{327B613C-1AD7-49D3-885D-F654C5CDBAA6}" type="datetime1">
               <a:rPr lang="en-US" smtClean="0"/>
               <a:pPr/>
-              <a:t>10/13/18</a:t>
+              <a:t>10/18/18</a:t>
             </a:fld>
             <a:endParaRPr lang="en-US" dirty="0"/>
           </a:p>
@@ -4824,7 +4994,7 @@
             <a:fld id="{327B613C-1AD7-49D3-885D-F654C5CDBAA6}" type="datetime1">
               <a:rPr lang="en-US" smtClean="0"/>
               <a:pPr/>
-              <a:t>10/13/18</a:t>
+              <a:t>10/18/18</a:t>
             </a:fld>
             <a:endParaRPr lang="en-US" dirty="0"/>
           </a:p>
@@ -5332,6 +5502,9 @@
           </a:bodyPr>
           <a:lstStyle/>
           <a:p>
+            <a:pPr marL="114300" indent="0">
+              <a:buNone/>
+            </a:pPr>
             <a:r>
               <a:rPr lang="en-US" dirty="0"/>
               <a:t>Two sets of stimuli designed according to two hypotheses.  </a:t>
@@ -5570,6 +5743,12 @@
             </a:r>
           </a:p>
           <a:p>
+            <a:r>
+              <a:rPr lang="en-US" dirty="0"/>
+              <a:t>9 nonce words (not controlled for number of syllables or stress).</a:t>
+            </a:r>
+          </a:p>
+          <a:p>
             <a:pPr lvl="1"/>
             <a:endParaRPr lang="en-US" dirty="0"/>
           </a:p>
@@ -5626,14 +5805,9 @@
               </a:spcBef>
             </a:pPr>
             <a:r>
-              <a:rPr lang="en-US" sz="4000" dirty="0" smtClean="0"/>
-              <a:t>Results</a:t>
-            </a:r>
-            <a:r>
-              <a:rPr lang="en-US" sz="4000" dirty="0" smtClean="0"/>
-              <a:t> – syllable division task</a:t>
-            </a:r>
-            <a:endParaRPr lang="en-US" sz="4000" dirty="0"/>
+              <a:rPr lang="en-US" sz="4000" dirty="0"/>
+              <a:t>Results – syllable division task</a:t>
+            </a:r>
           </a:p>
         </p:txBody>
       </p:sp>
@@ -5656,66 +5830,62 @@
           <a:p>
             <a:pPr lvl="1"/>
             <a:r>
-              <a:rPr lang="en-US" dirty="0" smtClean="0"/>
+              <a:rPr lang="en-US" dirty="0"/>
               <a:t>Questions: </a:t>
             </a:r>
           </a:p>
           <a:p>
             <a:pPr lvl="2"/>
             <a:r>
-              <a:rPr lang="en-US" dirty="0" smtClean="0"/>
-              <a:t>How do participants respond? </a:t>
-            </a:r>
-            <a:r>
-              <a:rPr lang="en-US" dirty="0" smtClean="0"/>
-              <a:t>Is GVG possible?</a:t>
+              <a:rPr lang="en-US" dirty="0"/>
+              <a:t>How do participants respond? Is GVG possible?</a:t>
             </a:r>
           </a:p>
           <a:p>
             <a:pPr lvl="2"/>
             <a:r>
-              <a:rPr lang="en-US" dirty="0" smtClean="0"/>
+              <a:rPr lang="en-US" dirty="0"/>
               <a:t>Does production depend on the glide type or the phonetic environment?</a:t>
             </a:r>
           </a:p>
           <a:p>
             <a:pPr lvl="2"/>
-            <a:endParaRPr lang="en-US" dirty="0" smtClean="0"/>
+            <a:endParaRPr lang="en-US" dirty="0"/>
           </a:p>
           <a:p>
             <a:pPr lvl="1"/>
             <a:r>
-              <a:rPr lang="en-US" dirty="0" smtClean="0"/>
+              <a:rPr lang="en-US" dirty="0"/>
               <a:t>Coding</a:t>
             </a:r>
           </a:p>
           <a:p>
             <a:pPr lvl="2"/>
             <a:r>
-              <a:rPr lang="en-US" b="1" dirty="0" smtClean="0"/>
+              <a:rPr lang="en-US" b="1" dirty="0"/>
               <a:t>Triphthong</a:t>
             </a:r>
             <a:r>
-              <a:rPr lang="en-US" dirty="0" smtClean="0"/>
+              <a:rPr lang="en-US" dirty="0"/>
               <a:t>: critical sequence produced in a single syllable</a:t>
             </a:r>
           </a:p>
           <a:p>
             <a:pPr lvl="3"/>
             <a:r>
-              <a:rPr lang="en-US" dirty="0" smtClean="0"/>
+              <a:rPr lang="en-US" dirty="0"/>
               <a:t>i.e. “</a:t>
             </a:r>
             <a:r>
-              <a:rPr lang="en-US" dirty="0" err="1" smtClean="0"/>
+              <a:rPr lang="en-US" dirty="0" err="1"/>
               <a:t>lakapiaisto</a:t>
             </a:r>
             <a:r>
-              <a:rPr lang="en-US" dirty="0" smtClean="0"/>
+              <a:rPr lang="en-US" dirty="0"/>
               <a:t>” ⇾ [</a:t>
             </a:r>
             <a:r>
-              <a:rPr lang="en-US" dirty="0" smtClean="0">
+              <a:rPr lang="en-US" dirty="0">
                 <a:latin typeface="Times New Roman" charset="0"/>
                 <a:ea typeface="Times New Roman" charset="0"/>
                 <a:cs typeface="Times New Roman" charset="0"/>
@@ -5723,74 +5893,50 @@
               <a:t>la.ka.ˈ</a:t>
             </a:r>
             <a:r>
-              <a:rPr lang="en-US" dirty="0" err="1" smtClean="0">
-                <a:latin typeface="Times New Roman" charset="0"/>
-                <a:ea typeface="Times New Roman" charset="0"/>
-                <a:cs typeface="Times New Roman" charset="0"/>
-              </a:rPr>
-              <a:t>pi̯ai</a:t>
-            </a:r>
-            <a:r>
               <a:rPr lang="en-US" dirty="0" err="1">
                 <a:latin typeface="Times New Roman" charset="0"/>
                 <a:ea typeface="Times New Roman" charset="0"/>
                 <a:cs typeface="Times New Roman" charset="0"/>
               </a:rPr>
-              <a:t>̯</a:t>
-            </a:r>
-            <a:r>
-              <a:rPr lang="en-US" dirty="0" err="1" smtClean="0">
-                <a:latin typeface="Times New Roman" charset="0"/>
-                <a:ea typeface="Times New Roman" charset="0"/>
-                <a:cs typeface="Times New Roman" charset="0"/>
-              </a:rPr>
-              <a:t>s.to</a:t>
-            </a:r>
-            <a:r>
-              <a:rPr lang="en-US" dirty="0" smtClean="0">
+              <a:t>pi̯ai̯s.to</a:t>
+            </a:r>
+            <a:r>
+              <a:rPr lang="en-US" dirty="0">
                 <a:latin typeface="Times New Roman" charset="0"/>
                 <a:ea typeface="Times New Roman" charset="0"/>
                 <a:cs typeface="Times New Roman" charset="0"/>
               </a:rPr>
               <a:t>]</a:t>
             </a:r>
-            <a:endParaRPr lang="en-US" dirty="0" smtClean="0"/>
+            <a:endParaRPr lang="en-US" dirty="0"/>
           </a:p>
           <a:p>
             <a:pPr lvl="2"/>
             <a:r>
-              <a:rPr lang="en-US" b="1" dirty="0" smtClean="0"/>
+              <a:rPr lang="en-US" b="1" dirty="0"/>
               <a:t>Hiatus: </a:t>
             </a:r>
             <a:r>
               <a:rPr lang="en-US" dirty="0"/>
-              <a:t>v</a:t>
-            </a:r>
-            <a:r>
-              <a:rPr lang="en-US" dirty="0" smtClean="0"/>
-              <a:t>owel + diphthong (CV + VGC), </a:t>
+              <a:t>vowel + diphthong (CV + VGC), </a:t>
             </a:r>
           </a:p>
           <a:p>
             <a:pPr lvl="3"/>
             <a:r>
-              <a:rPr lang="en-US" dirty="0" smtClean="0"/>
+              <a:rPr lang="en-US" dirty="0"/>
               <a:t>i.e., “</a:t>
             </a:r>
             <a:r>
-              <a:rPr lang="en-US" dirty="0" err="1" smtClean="0"/>
+              <a:rPr lang="en-US" dirty="0" err="1"/>
               <a:t>lakapiaisto</a:t>
             </a:r>
             <a:r>
-              <a:rPr lang="en-US" dirty="0" smtClean="0"/>
-              <a:t>” ⇾</a:t>
-            </a:r>
-            <a:r>
-              <a:rPr lang="en-US" dirty="0" smtClean="0"/>
-              <a:t> </a:t>
-            </a:r>
-            <a:r>
-              <a:rPr lang="en-US" dirty="0" smtClean="0">
+              <a:rPr lang="en-US" dirty="0"/>
+              <a:t>” ⇾ </a:t>
+            </a:r>
+            <a:r>
+              <a:rPr lang="en-US" dirty="0">
                 <a:latin typeface="Times New Roman" charset="0"/>
                 <a:ea typeface="Times New Roman" charset="0"/>
                 <a:cs typeface="Times New Roman" charset="0"/>
@@ -5801,35 +5947,27 @@
           <a:p>
             <a:pPr lvl="2"/>
             <a:r>
-              <a:rPr lang="en-US" b="1" dirty="0" smtClean="0"/>
+              <a:rPr lang="en-US" b="1" dirty="0"/>
               <a:t>Simplification</a:t>
             </a:r>
             <a:r>
-              <a:rPr lang="en-US" dirty="0" smtClean="0"/>
+              <a:rPr lang="en-US" dirty="0"/>
               <a:t>: a segment was elided (typically the pre-vocalic glide)</a:t>
             </a:r>
           </a:p>
           <a:p>
             <a:pPr lvl="3"/>
             <a:r>
-              <a:rPr lang="en-US" dirty="0" smtClean="0"/>
+              <a:rPr lang="en-US" dirty="0"/>
               <a:t>i.e., “</a:t>
             </a:r>
             <a:r>
-              <a:rPr lang="en-US" dirty="0" err="1" smtClean="0"/>
+              <a:rPr lang="en-US" dirty="0" err="1"/>
               <a:t>lakapiaisto</a:t>
             </a:r>
             <a:r>
-              <a:rPr lang="en-US" dirty="0" smtClean="0"/>
+              <a:rPr lang="en-US" dirty="0"/>
               <a:t>” ⇾ [la.ka.</a:t>
-            </a:r>
-            <a:r>
-              <a:rPr lang="en-US" dirty="0" smtClean="0">
-                <a:latin typeface="Times New Roman" charset="0"/>
-                <a:ea typeface="Times New Roman" charset="0"/>
-                <a:cs typeface="Times New Roman" charset="0"/>
-              </a:rPr>
-              <a:t>ˈpai</a:t>
             </a:r>
             <a:r>
               <a:rPr lang="en-US" dirty="0">
@@ -5837,10 +5975,10 @@
                 <a:ea typeface="Times New Roman" charset="0"/>
                 <a:cs typeface="Times New Roman" charset="0"/>
               </a:rPr>
-              <a:t>̯s</a:t>
-            </a:r>
-            <a:r>
-              <a:rPr lang="en-US" dirty="0" smtClean="0"/>
+              <a:t>ˈpai̯s</a:t>
+            </a:r>
+            <a:r>
+              <a:rPr lang="en-US" dirty="0"/>
               <a:t>.to]</a:t>
             </a:r>
           </a:p>
@@ -5851,36 +5989,35 @@
           <a:p>
             <a:pPr lvl="1"/>
             <a:r>
-              <a:rPr lang="en-US" dirty="0" smtClean="0"/>
+              <a:rPr lang="en-US" dirty="0"/>
               <a:t>Analysis</a:t>
             </a:r>
           </a:p>
           <a:p>
             <a:pPr lvl="2"/>
             <a:r>
-              <a:rPr lang="en-US" dirty="0" smtClean="0"/>
+              <a:rPr lang="en-US" dirty="0"/>
               <a:t>Multinomial mixed-effects regression</a:t>
             </a:r>
           </a:p>
           <a:p>
             <a:pPr lvl="2"/>
             <a:r>
-              <a:rPr lang="en-US" dirty="0" smtClean="0"/>
+              <a:rPr lang="en-US" dirty="0"/>
               <a:t>Model: response ~ glide_type + </a:t>
             </a:r>
             <a:r>
-              <a:rPr lang="en-US" dirty="0" err="1" smtClean="0"/>
+              <a:rPr lang="en-US" dirty="0" err="1"/>
               <a:t>preceding_consonant</a:t>
             </a:r>
-            <a:endParaRPr lang="en-US" dirty="0" smtClean="0"/>
+            <a:endParaRPr lang="en-US" dirty="0"/>
           </a:p>
           <a:p>
             <a:pPr lvl="2"/>
             <a:r>
-              <a:rPr lang="en-US" dirty="0" smtClean="0"/>
+              <a:rPr lang="en-US" dirty="0"/>
               <a:t>Random effects: by-subject/by-item intercepts with random slopes glide and preceding consonant</a:t>
             </a:r>
-            <a:endParaRPr lang="en-US" dirty="0"/>
           </a:p>
         </p:txBody>
       </p:sp>
@@ -5894,13 +6031,6 @@
   <p:clrMapOvr>
     <a:masterClrMapping/>
   </p:clrMapOvr>
-  <p:timing>
-    <p:tnLst>
-      <p:par>
-        <p:cTn id="1" dur="indefinite" restart="never" nodeType="tmRoot"/>
-      </p:par>
-    </p:tnLst>
-  </p:timing>
 </p:sld>
 </file>
 
@@ -5931,7 +6061,7 @@
       </p:grpSpPr>
       <p:pic>
         <p:nvPicPr>
-          <p:cNvPr id="7" name="Picture 6"/>
+          <p:cNvPr id="2" name="Picture 1"/>
           <p:cNvPicPr>
             <a:picLocks noChangeAspect="1"/>
           </p:cNvPicPr>
@@ -5969,13 +6099,6 @@
   <p:clrMapOvr>
     <a:masterClrMapping/>
   </p:clrMapOvr>
-  <p:timing>
-    <p:tnLst>
-      <p:par>
-        <p:cTn id="1" dur="indefinite" restart="never" nodeType="tmRoot"/>
-      </p:par>
-    </p:tnLst>
-  </p:timing>
 </p:sld>
 </file>
 
@@ -6006,7 +6129,7 @@
       </p:grpSpPr>
       <p:pic>
         <p:nvPicPr>
-          <p:cNvPr id="5" name="Picture 4"/>
+          <p:cNvPr id="2" name="Picture 1"/>
           <p:cNvPicPr>
             <a:picLocks noChangeAspect="1"/>
           </p:cNvPicPr>
@@ -6044,13 +6167,6 @@
   <p:clrMapOvr>
     <a:masterClrMapping/>
   </p:clrMapOvr>
-  <p:timing>
-    <p:tnLst>
-      <p:par>
-        <p:cTn id="1" dur="indefinite" restart="never" nodeType="tmRoot"/>
-      </p:par>
-    </p:tnLst>
-  </p:timing>
 </p:sld>
 </file>
 
@@ -6087,66 +6203,48 @@
           <a:lstStyle/>
           <a:p>
             <a:r>
-              <a:rPr lang="en-US" dirty="0" smtClean="0"/>
+              <a:rPr lang="en-US" dirty="0"/>
               <a:t>Takeaways</a:t>
             </a:r>
+          </a:p>
+        </p:txBody>
+      </p:sp>
+      <p:sp>
+        <p:nvSpPr>
+          <p:cNvPr id="3" name="Content Placeholder 2"/>
+          <p:cNvSpPr>
+            <a:spLocks noGrp="1"/>
+          </p:cNvSpPr>
+          <p:nvPr>
+            <p:ph idx="1"/>
+          </p:nvPr>
+        </p:nvSpPr>
+        <p:spPr/>
+        <p:txBody>
+          <a:bodyPr/>
+          <a:lstStyle/>
+          <a:p>
+            <a:r>
+              <a:rPr lang="en-US" dirty="0"/>
+              <a:t>Triphthongs were produced in approximately 45% of the targets. </a:t>
+            </a:r>
+          </a:p>
+          <a:p>
             <a:endParaRPr lang="en-US" dirty="0"/>
           </a:p>
-        </p:txBody>
-      </p:sp>
-      <p:sp>
-        <p:nvSpPr>
-          <p:cNvPr id="3" name="Content Placeholder 2"/>
-          <p:cNvSpPr>
-            <a:spLocks noGrp="1"/>
-          </p:cNvSpPr>
-          <p:nvPr>
-            <p:ph idx="1"/>
-          </p:nvPr>
-        </p:nvSpPr>
-        <p:spPr/>
-        <p:txBody>
-          <a:bodyPr/>
-          <a:lstStyle/>
-          <a:p>
-            <a:r>
-              <a:rPr lang="en-US" dirty="0" smtClean="0"/>
-              <a:t>Triphthongs </a:t>
-            </a:r>
-            <a:r>
-              <a:rPr lang="en-US" dirty="0"/>
-              <a:t>were produced in approximately 45% of the targets. </a:t>
-            </a:r>
-            <a:endParaRPr lang="en-US" dirty="0" smtClean="0"/>
-          </a:p>
-          <a:p>
-            <a:endParaRPr lang="en-US" dirty="0" smtClean="0"/>
-          </a:p>
-          <a:p>
-            <a:r>
-              <a:rPr lang="en-US" dirty="0" smtClean="0"/>
-              <a:t>A </a:t>
-            </a:r>
-            <a:r>
-              <a:rPr lang="en-US" dirty="0"/>
-              <a:t>production containing a hiatus made up roughly 30% of the data, followed by a simplification of some sort (~25% of the time</a:t>
-            </a:r>
-            <a:r>
-              <a:rPr lang="en-US" dirty="0" smtClean="0"/>
-              <a:t>)</a:t>
-            </a:r>
-          </a:p>
-          <a:p>
-            <a:endParaRPr lang="en-US" dirty="0" smtClean="0"/>
-          </a:p>
-          <a:p>
-            <a:r>
-              <a:rPr lang="en-US" dirty="0" smtClean="0"/>
-              <a:t>Overall</a:t>
-            </a:r>
-            <a:r>
-              <a:rPr lang="en-US" dirty="0"/>
-              <a:t>, the task provides evidence supporting the hypothesis that pre-vocalic glides </a:t>
+          <a:p>
+            <a:r>
+              <a:rPr lang="en-US" dirty="0"/>
+              <a:t>A production containing a hiatus made up roughly 30% of the data, followed by a simplification of some sort (~25% of the time)</a:t>
+            </a:r>
+          </a:p>
+          <a:p>
+            <a:endParaRPr lang="en-US" dirty="0"/>
+          </a:p>
+          <a:p>
+            <a:r>
+              <a:rPr lang="en-US" dirty="0"/>
+              <a:t>Overall, the task provides evidence supporting the hypothesis that pre-vocalic glides </a:t>
             </a:r>
             <a:r>
               <a:rPr lang="en-US" b="1" dirty="0"/>
@@ -6156,7 +6254,6 @@
               <a:rPr lang="en-US" dirty="0"/>
               <a:t> be part of the onset in this variety of Spanish.</a:t>
             </a:r>
-            <a:endParaRPr lang="en-US" dirty="0"/>
           </a:p>
         </p:txBody>
       </p:sp>
@@ -6206,47 +6303,46 @@
           <a:lstStyle/>
           <a:p>
             <a:r>
-              <a:rPr lang="en-US" dirty="0" smtClean="0"/>
+              <a:rPr lang="en-US" dirty="0"/>
               <a:t>Results </a:t>
             </a:r>
             <a:r>
-              <a:rPr lang="mr-IN" dirty="0" smtClean="0"/>
+              <a:rPr lang="mr-IN" dirty="0"/>
               <a:t>–</a:t>
             </a:r>
             <a:r>
-              <a:rPr lang="en-US" dirty="0" smtClean="0"/>
+              <a:rPr lang="en-US" dirty="0"/>
               <a:t> phrase reading</a:t>
             </a:r>
+          </a:p>
+        </p:txBody>
+      </p:sp>
+      <p:sp>
+        <p:nvSpPr>
+          <p:cNvPr id="3" name="Content Placeholder 2"/>
+          <p:cNvSpPr>
+            <a:spLocks noGrp="1"/>
+          </p:cNvSpPr>
+          <p:nvPr>
+            <p:ph idx="1"/>
+          </p:nvPr>
+        </p:nvSpPr>
+        <p:spPr/>
+        <p:txBody>
+          <a:bodyPr/>
+          <a:lstStyle/>
+          <a:p>
+            <a:r>
+              <a:rPr lang="en-US" dirty="0"/>
+              <a:t>Hypothesis: Pre-vocalic glides will be disallowed if preceded by a palatal consonant</a:t>
+            </a:r>
+          </a:p>
+          <a:p>
             <a:endParaRPr lang="en-US" dirty="0"/>
           </a:p>
-        </p:txBody>
-      </p:sp>
-      <p:sp>
-        <p:nvSpPr>
-          <p:cNvPr id="3" name="Content Placeholder 2"/>
-          <p:cNvSpPr>
-            <a:spLocks noGrp="1"/>
-          </p:cNvSpPr>
-          <p:nvPr>
-            <p:ph idx="1"/>
-          </p:nvPr>
-        </p:nvSpPr>
-        <p:spPr/>
-        <p:txBody>
-          <a:bodyPr/>
-          <a:lstStyle/>
-          <a:p>
-            <a:r>
-              <a:rPr lang="en-US" dirty="0" smtClean="0"/>
-              <a:t>Hypothesis: Pre-vocalic glides will be disallowed if preceded by a palatal consonant</a:t>
-            </a:r>
-          </a:p>
-          <a:p>
-            <a:endParaRPr lang="en-US" dirty="0"/>
-          </a:p>
-          <a:p>
-            <a:r>
-              <a:rPr lang="en-US" dirty="0" smtClean="0"/>
+          <a:p>
+            <a:r>
+              <a:rPr lang="en-US" dirty="0"/>
               <a:t>Measure duration, F1, and intensity of the pre-vocalic glide in two environments: after a palatal consonant, after any other consonant</a:t>
             </a:r>
           </a:p>
@@ -6262,13 +6358,6 @@
   <p:clrMapOvr>
     <a:masterClrMapping/>
   </p:clrMapOvr>
-  <p:timing>
-    <p:tnLst>
-      <p:par>
-        <p:cTn id="1" dur="indefinite" restart="never" nodeType="tmRoot"/>
-      </p:par>
-    </p:tnLst>
-  </p:timing>
 </p:sld>
 </file>
 
@@ -6314,71 +6403,60 @@
             </a:r>
             <a:r>
               <a:rPr lang="en-US" dirty="0"/>
-              <a:t> </a:t>
-            </a:r>
-            <a:r>
-              <a:rPr lang="en-US" dirty="0" smtClean="0"/>
-              <a:t>phrase reading</a:t>
-            </a:r>
+              <a:t> phrase reading</a:t>
+            </a:r>
+          </a:p>
+        </p:txBody>
+      </p:sp>
+      <p:sp>
+        <p:nvSpPr>
+          <p:cNvPr id="3" name="Content Placeholder 2"/>
+          <p:cNvSpPr>
+            <a:spLocks noGrp="1"/>
+          </p:cNvSpPr>
+          <p:nvPr>
+            <p:ph idx="1"/>
+          </p:nvPr>
+        </p:nvSpPr>
+        <p:spPr/>
+        <p:txBody>
+          <a:bodyPr/>
+          <a:lstStyle/>
+          <a:p>
+            <a:r>
+              <a:rPr lang="en-US" dirty="0"/>
+              <a:t>If pre-vocalic glides are blocked after palatals, we expect to observe differences in overall duration.</a:t>
+            </a:r>
+          </a:p>
+          <a:p>
             <a:endParaRPr lang="en-US" dirty="0"/>
           </a:p>
-        </p:txBody>
-      </p:sp>
-      <p:sp>
-        <p:nvSpPr>
-          <p:cNvPr id="3" name="Content Placeholder 2"/>
-          <p:cNvSpPr>
-            <a:spLocks noGrp="1"/>
-          </p:cNvSpPr>
-          <p:nvPr>
-            <p:ph idx="1"/>
-          </p:nvPr>
-        </p:nvSpPr>
-        <p:spPr/>
-        <p:txBody>
-          <a:bodyPr/>
-          <a:lstStyle/>
-          <a:p>
-            <a:r>
-              <a:rPr lang="en-US" dirty="0"/>
-              <a:t>If pre-vocalic glides are blocked after palatals, we expect to observe differences in overall duration</a:t>
-            </a:r>
-            <a:r>
-              <a:rPr lang="en-US" dirty="0" smtClean="0"/>
-              <a:t>.</a:t>
-            </a:r>
-            <a:endParaRPr lang="en-US" dirty="0"/>
-          </a:p>
-          <a:p>
-            <a:endParaRPr lang="en-US" dirty="0" smtClean="0"/>
-          </a:p>
-          <a:p>
-            <a:r>
-              <a:rPr lang="en-US" dirty="0" smtClean="0"/>
+          <a:p>
+            <a:r>
+              <a:rPr lang="en-US" dirty="0"/>
               <a:t>Analysis</a:t>
             </a:r>
           </a:p>
           <a:p>
             <a:pPr lvl="1"/>
             <a:r>
-              <a:rPr lang="en-US" dirty="0" smtClean="0"/>
+              <a:rPr lang="en-US" dirty="0"/>
               <a:t>Linear mixed effects model</a:t>
             </a:r>
           </a:p>
           <a:p>
             <a:pPr lvl="1"/>
             <a:r>
-              <a:rPr lang="en-US" dirty="0" smtClean="0"/>
+              <a:rPr lang="en-US" dirty="0"/>
               <a:t>Model: duration ~ environment</a:t>
             </a:r>
           </a:p>
           <a:p>
             <a:pPr lvl="1"/>
             <a:r>
-              <a:rPr lang="en-US" dirty="0" smtClean="0"/>
+              <a:rPr lang="en-US" dirty="0"/>
               <a:t>Random effect: by-subject/by-item intercepts with random slopes for preceding consonant</a:t>
             </a:r>
-            <a:endParaRPr lang="en-US" dirty="0"/>
           </a:p>
         </p:txBody>
       </p:sp>
@@ -6392,13 +6470,6 @@
   <p:clrMapOvr>
     <a:masterClrMapping/>
   </p:clrMapOvr>
-  <p:timing>
-    <p:tnLst>
-      <p:par>
-        <p:cTn id="1" dur="indefinite" restart="never" nodeType="tmRoot"/>
-      </p:par>
-    </p:tnLst>
-  </p:timing>
 </p:sld>
 </file>
 
@@ -6467,13 +6538,6 @@
   <p:clrMapOvr>
     <a:masterClrMapping/>
   </p:clrMapOvr>
-  <p:timing>
-    <p:tnLst>
-      <p:par>
-        <p:cTn id="1" dur="indefinite" restart="never" nodeType="tmRoot"/>
-      </p:par>
-    </p:tnLst>
-  </p:timing>
 </p:sld>
 </file>
 
@@ -6541,17 +6605,17 @@
           <a:p>
             <a:r>
               <a:rPr lang="en-US" sz="2400" dirty="0"/>
-              <a:t>We can examine the plausibility of (1) by looking at the formant trajectory over </a:t>
-            </a:r>
-            <a:r>
-              <a:rPr lang="en-US" sz="2400" dirty="0" smtClean="0"/>
-              <a:t>the </a:t>
-            </a:r>
+              <a:t>We can examine the plausibility of (1) by looking at the formant trajectory over the course of the segment. </a:t>
+            </a:r>
+          </a:p>
+          <a:p>
+            <a:endParaRPr lang="en-US" sz="2400" dirty="0"/>
+          </a:p>
+          <a:p>
             <a:r>
               <a:rPr lang="en-US" sz="2400" dirty="0"/>
-              <a:t>course of the segment. </a:t>
-            </a:r>
-            <a:endParaRPr lang="en-US" sz="2400" dirty="0" smtClean="0"/>
+              <a:t>If the participants are able to produce a glide in some contexts but not others we should see differences in F1 as a function of the preceding consonant.</a:t>
+            </a:r>
           </a:p>
           <a:p>
             <a:endParaRPr lang="en-US" sz="2400" dirty="0"/>
@@ -6559,48 +6623,30 @@
           <a:p>
             <a:r>
               <a:rPr lang="en-US" sz="2400" dirty="0"/>
-              <a:t>If the participants are able to produce a glide in some contexts but not others </a:t>
-            </a:r>
-            <a:r>
-              <a:rPr lang="en-US" sz="2400" dirty="0" smtClean="0"/>
-              <a:t>we </a:t>
-            </a:r>
-            <a:r>
-              <a:rPr lang="en-US" sz="2400" dirty="0"/>
-              <a:t>should see differences in F1 as a function of the preceding consonant.</a:t>
-            </a:r>
-          </a:p>
-          <a:p>
-            <a:endParaRPr lang="en-US" sz="2400" dirty="0" smtClean="0"/>
-          </a:p>
-          <a:p>
-            <a:r>
-              <a:rPr lang="en-US" sz="2400" dirty="0" smtClean="0"/>
               <a:t>Analysis</a:t>
             </a:r>
           </a:p>
           <a:p>
             <a:pPr lvl="1"/>
             <a:r>
-              <a:rPr lang="en-US" dirty="0" smtClean="0"/>
+              <a:rPr lang="en-US" dirty="0"/>
               <a:t>Generalized Additive Mixed Model</a:t>
             </a:r>
           </a:p>
           <a:p>
             <a:pPr lvl="1"/>
             <a:r>
-              <a:rPr lang="en-US" dirty="0" smtClean="0"/>
+              <a:rPr lang="en-US" dirty="0"/>
               <a:t>Model: F1 ~ </a:t>
             </a:r>
             <a:r>
-              <a:rPr lang="en-US" dirty="0" err="1" smtClean="0"/>
+              <a:rPr lang="en-US" dirty="0" err="1"/>
               <a:t>preceding_consonant</a:t>
             </a:r>
             <a:r>
-              <a:rPr lang="en-US" dirty="0" smtClean="0"/>
+              <a:rPr lang="en-US" dirty="0"/>
               <a:t> + time</a:t>
             </a:r>
-            <a:endParaRPr lang="en-US" dirty="0"/>
           </a:p>
           <a:p>
             <a:endParaRPr lang="en-US" dirty="0"/>
@@ -6617,13 +6663,6 @@
   <p:clrMapOvr>
     <a:masterClrMapping/>
   </p:clrMapOvr>
-  <p:timing>
-    <p:tnLst>
-      <p:par>
-        <p:cTn id="1" dur="indefinite" restart="never" nodeType="tmRoot"/>
-      </p:par>
-    </p:tnLst>
-  </p:timing>
 </p:sld>
 </file>
 
@@ -6800,13 +6839,6 @@
   <p:clrMapOvr>
     <a:masterClrMapping/>
   </p:clrMapOvr>
-  <p:timing>
-    <p:tnLst>
-      <p:par>
-        <p:cTn id="1" dur="indefinite" restart="never" nodeType="tmRoot"/>
-      </p:par>
-    </p:tnLst>
-  </p:timing>
 </p:sld>
 </file>
 
@@ -6876,38 +6908,13 @@
           <a:p>
             <a:r>
               <a:rPr lang="en-US" dirty="0"/>
-              <a:t>S</a:t>
-            </a:r>
-            <a:r>
-              <a:rPr lang="en-US" dirty="0" smtClean="0"/>
-              <a:t>econd possibility: participants </a:t>
-            </a:r>
-            <a:r>
-              <a:rPr lang="en-US" dirty="0"/>
-              <a:t>are lengthening the palatal consonant (not producing a glide) </a:t>
-            </a:r>
-            <a:r>
-              <a:rPr lang="en-US" dirty="0" smtClean="0"/>
-              <a:t>because of the fact that they </a:t>
-            </a:r>
-            <a:r>
-              <a:rPr lang="en-US" dirty="0"/>
-              <a:t>cannot produce both. </a:t>
-            </a:r>
-            <a:endParaRPr lang="en-US" dirty="0" smtClean="0"/>
-          </a:p>
-          <a:p>
-            <a:r>
-              <a:rPr lang="en-US" dirty="0" smtClean="0"/>
-              <a:t>In </a:t>
-            </a:r>
-            <a:r>
-              <a:rPr lang="en-US" dirty="0"/>
-              <a:t>other words, they might be trying to produce something, but because the target is illicit, they resort to lengthening the onset</a:t>
-            </a:r>
-            <a:r>
-              <a:rPr lang="en-US" dirty="0" smtClean="0"/>
-              <a:t>.</a:t>
+              <a:t>Second possibility: participants are lengthening the palatal consonant (not producing a glide) because of the fact that they cannot produce both. </a:t>
+            </a:r>
+          </a:p>
+          <a:p>
+            <a:r>
+              <a:rPr lang="en-US" dirty="0"/>
+              <a:t>In other words, they might be trying to produce something, but because the target is illicit, they resort to lengthening the onset.</a:t>
             </a:r>
           </a:p>
           <a:p>
@@ -6915,51 +6922,14 @@
           </a:p>
           <a:p>
             <a:r>
-              <a:rPr lang="en-US" dirty="0" smtClean="0"/>
-              <a:t>Prediction: intensity </a:t>
-            </a:r>
-            <a:r>
-              <a:rPr lang="en-US" dirty="0"/>
-              <a:t>of the lengthened </a:t>
-            </a:r>
-            <a:r>
-              <a:rPr lang="en-US" dirty="0" smtClean="0"/>
-              <a:t>segment should </a:t>
-            </a:r>
-            <a:r>
-              <a:rPr lang="en-US" dirty="0"/>
-              <a:t>be lower </a:t>
-            </a:r>
-            <a:r>
-              <a:rPr lang="en-US" dirty="0" smtClean="0"/>
-              <a:t>than that </a:t>
-            </a:r>
-            <a:r>
-              <a:rPr lang="en-US" dirty="0"/>
-              <a:t>of a glide. </a:t>
-            </a:r>
-            <a:endParaRPr lang="en-US" dirty="0" smtClean="0"/>
-          </a:p>
-          <a:p>
-            <a:r>
-              <a:rPr lang="en-US" dirty="0" smtClean="0"/>
-              <a:t>Why</a:t>
-            </a:r>
-            <a:r>
-              <a:rPr lang="en-US" dirty="0"/>
-              <a:t>? </a:t>
-            </a:r>
-            <a:r>
-              <a:rPr lang="en-US" dirty="0" smtClean="0"/>
-              <a:t>More </a:t>
-            </a:r>
-            <a:r>
-              <a:rPr lang="en-US" dirty="0"/>
-              <a:t>consonant-like productions have lower intensity than more vowel-like productions</a:t>
-            </a:r>
-            <a:r>
-              <a:rPr lang="en-US" dirty="0" smtClean="0"/>
-              <a:t>.</a:t>
+              <a:rPr lang="en-US" dirty="0"/>
+              <a:t>Prediction: intensity of the lengthened segment should be lower than that of a glide. </a:t>
+            </a:r>
+          </a:p>
+          <a:p>
+            <a:r>
+              <a:rPr lang="en-US" dirty="0"/>
+              <a:t>Why? More consonant-like productions have lower intensity than more vowel-like productions.</a:t>
             </a:r>
           </a:p>
           <a:p>
@@ -6982,15 +6952,7 @@
             <a:pPr lvl="1"/>
             <a:r>
               <a:rPr lang="en-US" dirty="0"/>
-              <a:t>Model: </a:t>
-            </a:r>
-            <a:r>
-              <a:rPr lang="en-US" dirty="0" smtClean="0"/>
-              <a:t>Intensity </a:t>
-            </a:r>
-            <a:r>
-              <a:rPr lang="en-US" dirty="0"/>
-              <a:t>~ </a:t>
+              <a:t>Model: Intensity ~ </a:t>
             </a:r>
             <a:r>
               <a:rPr lang="en-US" dirty="0" err="1"/>
@@ -7016,13 +6978,6 @@
   <p:clrMapOvr>
     <a:masterClrMapping/>
   </p:clrMapOvr>
-  <p:timing>
-    <p:tnLst>
-      <p:par>
-        <p:cTn id="1" dur="indefinite" restart="never" nodeType="tmRoot"/>
-      </p:par>
-    </p:tnLst>
-  </p:timing>
 </p:sld>
 </file>
 
@@ -7091,13 +7046,6 @@
   <p:clrMapOvr>
     <a:masterClrMapping/>
   </p:clrMapOvr>
-  <p:timing>
-    <p:tnLst>
-      <p:par>
-        <p:cTn id="1" dur="indefinite" restart="never" nodeType="tmRoot"/>
-      </p:par>
-    </p:tnLst>
-  </p:timing>
 </p:sld>
 </file>
 
@@ -7166,13 +7114,6 @@
   <p:clrMapOvr>
     <a:masterClrMapping/>
   </p:clrMapOvr>
-  <p:timing>
-    <p:tnLst>
-      <p:par>
-        <p:cTn id="1" dur="indefinite" restart="never" nodeType="tmRoot"/>
-      </p:par>
-    </p:tnLst>
-  </p:timing>
 </p:sld>
 </file>
 
@@ -7209,10 +7150,9 @@
           <a:lstStyle/>
           <a:p>
             <a:r>
-              <a:rPr lang="en-US" dirty="0" smtClean="0"/>
+              <a:rPr lang="en-US" dirty="0"/>
               <a:t>Summary</a:t>
             </a:r>
-            <a:endParaRPr lang="en-US" dirty="0"/>
           </a:p>
         </p:txBody>
       </p:sp>
@@ -7232,14 +7172,14 @@
           <a:lstStyle/>
           <a:p>
             <a:r>
-              <a:rPr lang="en-US" dirty="0" smtClean="0"/>
+              <a:rPr lang="en-US" dirty="0"/>
               <a:t>Sonoran speakers used variable strategies when producing the CGVGC sequences</a:t>
             </a:r>
           </a:p>
           <a:p>
             <a:pPr lvl="1"/>
             <a:r>
-              <a:rPr lang="en-US" dirty="0" smtClean="0"/>
+              <a:rPr lang="en-US" dirty="0"/>
               <a:t>Importantly, they produced the GVG sequence at least some of the time (thus it is possible)</a:t>
             </a:r>
           </a:p>
@@ -7249,14 +7189,14 @@
           </a:p>
           <a:p>
             <a:r>
-              <a:rPr lang="en-US" dirty="0" smtClean="0"/>
+              <a:rPr lang="en-US" dirty="0"/>
               <a:t>Acoustic analysis shows that pre-vocalic segments are longer after palatal consonants</a:t>
             </a:r>
           </a:p>
           <a:p>
             <a:pPr lvl="1"/>
             <a:r>
-              <a:rPr lang="en-US" dirty="0" smtClean="0"/>
+              <a:rPr lang="en-US" dirty="0"/>
               <a:t>Not shorter (i.e., elided because they are blocked)</a:t>
             </a:r>
           </a:p>
@@ -7266,17 +7206,16 @@
           </a:p>
           <a:p>
             <a:r>
-              <a:rPr lang="en-US" dirty="0" smtClean="0"/>
+              <a:rPr lang="en-US" dirty="0"/>
               <a:t>Analysis of the time course suggests the duration increase could be due to lengthening of onset</a:t>
             </a:r>
           </a:p>
           <a:p>
             <a:pPr lvl="1"/>
             <a:r>
-              <a:rPr lang="en-US" dirty="0" smtClean="0"/>
+              <a:rPr lang="en-US" dirty="0"/>
               <a:t>Strategy to avoid illicit sequence</a:t>
             </a:r>
-            <a:endParaRPr lang="en-US" dirty="0"/>
           </a:p>
         </p:txBody>
       </p:sp>
@@ -7326,36 +7265,68 @@
           <a:lstStyle/>
           <a:p>
             <a:r>
-              <a:rPr lang="en-US" dirty="0" smtClean="0"/>
-              <a:t>Discussion</a:t>
-            </a:r>
+              <a:rPr lang="en-US" dirty="0"/>
+              <a:t>Research question/s</a:t>
+            </a:r>
+          </a:p>
+        </p:txBody>
+      </p:sp>
+      <p:sp>
+        <p:nvSpPr>
+          <p:cNvPr id="3" name="Content Placeholder 2"/>
+          <p:cNvSpPr>
+            <a:spLocks noGrp="1"/>
+          </p:cNvSpPr>
+          <p:nvPr>
+            <p:ph idx="1"/>
+          </p:nvPr>
+        </p:nvSpPr>
+        <p:spPr/>
+        <p:txBody>
+          <a:bodyPr/>
+          <a:lstStyle/>
+          <a:p>
+            <a:r>
+              <a:rPr lang="en-US" dirty="0"/>
+              <a:t>Q1: Is a postconsonantal, prevocalic glide parsed as the second segment of a complex onset in Sonoran Spanish?</a:t>
+            </a:r>
+          </a:p>
+          <a:p>
+            <a:pPr marL="114300" indent="0">
+              <a:buNone/>
+            </a:pPr>
+            <a:r>
+              <a:rPr lang="en-US" dirty="0"/>
+              <a:t>	A1:Yes, at least some of the time.</a:t>
+            </a:r>
+          </a:p>
+          <a:p>
+            <a:pPr marL="114300" indent="0">
+              <a:buNone/>
+            </a:pPr>
             <a:endParaRPr lang="en-US" dirty="0"/>
           </a:p>
-        </p:txBody>
-      </p:sp>
-      <p:sp>
-        <p:nvSpPr>
-          <p:cNvPr id="3" name="Content Placeholder 2"/>
-          <p:cNvSpPr>
-            <a:spLocks noGrp="1"/>
-          </p:cNvSpPr>
-          <p:nvPr>
-            <p:ph idx="1"/>
-          </p:nvPr>
-        </p:nvSpPr>
-        <p:spPr/>
-        <p:txBody>
-          <a:bodyPr/>
-          <a:lstStyle/>
-          <a:p>
-            <a:endParaRPr lang="en-US"/>
+          <a:p>
+            <a:r>
+              <a:rPr lang="en-US" dirty="0"/>
+              <a:t>Q2: In more general terms, the question is: are Spanish prevocalic glides always part of a complex nucleus (preceding a full vowel, in a diphthong) or can the glide be parsed in the onset in some dialects?</a:t>
+            </a:r>
+          </a:p>
+          <a:p>
+            <a:pPr marL="114300" indent="0">
+              <a:buNone/>
+            </a:pPr>
+            <a:r>
+              <a:rPr lang="en-US" dirty="0"/>
+              <a:t>	A2:The glide can be parsed in the onset in dialects like 	Sonoran Spanish, but it is not categorical</a:t>
+            </a:r>
           </a:p>
         </p:txBody>
       </p:sp>
     </p:spTree>
     <p:extLst>
       <p:ext uri="{BB962C8B-B14F-4D97-AF65-F5344CB8AC3E}">
-        <p14:creationId xmlns:p14="http://schemas.microsoft.com/office/powerpoint/2010/main" val="755042536"/>
+        <p14:creationId xmlns:p14="http://schemas.microsoft.com/office/powerpoint/2010/main" val="3544568343"/>
       </p:ext>
     </p:extLst>
   </p:cSld>
@@ -7398,36 +7369,49 @@
           <a:lstStyle/>
           <a:p>
             <a:r>
-              <a:rPr lang="en-US" dirty="0" smtClean="0"/>
-              <a:t>Conclusion</a:t>
-            </a:r>
+              <a:rPr lang="en-US" dirty="0"/>
+              <a:t>Discussion</a:t>
+            </a:r>
+          </a:p>
+        </p:txBody>
+      </p:sp>
+      <p:sp>
+        <p:nvSpPr>
+          <p:cNvPr id="3" name="Content Placeholder 2"/>
+          <p:cNvSpPr>
+            <a:spLocks noGrp="1"/>
+          </p:cNvSpPr>
+          <p:nvPr>
+            <p:ph idx="1"/>
+          </p:nvPr>
+        </p:nvSpPr>
+        <p:spPr/>
+        <p:txBody>
+          <a:bodyPr>
+            <a:normAutofit/>
+          </a:bodyPr>
+          <a:lstStyle/>
+          <a:p>
+            <a:r>
+              <a:rPr lang="en-US" sz="2400" dirty="0"/>
+              <a:t>Acoustic analysis shows that pre-vocalic segments are longer after palatal consonants, revealing a strategy to avoid an illicit sequence. In the syllabification task, speakers produce triphthongs in 45% of the targets, so onset parsing is possible,  but not categorical. </a:t>
+            </a:r>
+          </a:p>
+          <a:p>
+            <a:r>
+              <a:rPr lang="en-US" sz="2400" dirty="0"/>
+              <a:t>As predicted, onset parsing suggests cross-dialectal variation in the syllabic affiliation of prevocalic glides. Furthermore, the parsing of glides also exhibits dialect-internal variation, as some, but not all glides are in parsed the onset.</a:t>
+            </a:r>
+          </a:p>
+          <a:p>
             <a:endParaRPr lang="en-US" dirty="0"/>
-          </a:p>
-        </p:txBody>
-      </p:sp>
-      <p:sp>
-        <p:nvSpPr>
-          <p:cNvPr id="3" name="Content Placeholder 2"/>
-          <p:cNvSpPr>
-            <a:spLocks noGrp="1"/>
-          </p:cNvSpPr>
-          <p:nvPr>
-            <p:ph idx="1"/>
-          </p:nvPr>
-        </p:nvSpPr>
-        <p:spPr/>
-        <p:txBody>
-          <a:bodyPr/>
-          <a:lstStyle/>
-          <a:p>
-            <a:endParaRPr lang="en-US"/>
           </a:p>
         </p:txBody>
       </p:sp>
     </p:spTree>
     <p:extLst>
       <p:ext uri="{BB962C8B-B14F-4D97-AF65-F5344CB8AC3E}">
-        <p14:creationId xmlns:p14="http://schemas.microsoft.com/office/powerpoint/2010/main" val="1826730619"/>
+        <p14:creationId xmlns:p14="http://schemas.microsoft.com/office/powerpoint/2010/main" val="755042536"/>
       </p:ext>
     </p:extLst>
   </p:cSld>
@@ -7471,6 +7455,246 @@
           <a:p>
             <a:r>
               <a:rPr lang="en-US" dirty="0"/>
+              <a:t>Discussion</a:t>
+            </a:r>
+          </a:p>
+        </p:txBody>
+      </p:sp>
+      <p:sp>
+        <p:nvSpPr>
+          <p:cNvPr id="3" name="Content Placeholder 2"/>
+          <p:cNvSpPr>
+            <a:spLocks noGrp="1"/>
+          </p:cNvSpPr>
+          <p:nvPr>
+            <p:ph idx="1"/>
+          </p:nvPr>
+        </p:nvSpPr>
+        <p:spPr/>
+        <p:txBody>
+          <a:bodyPr>
+            <a:normAutofit/>
+          </a:bodyPr>
+          <a:lstStyle/>
+          <a:p>
+            <a:r>
+              <a:rPr lang="en-US" dirty="0"/>
+              <a:t>The rankings predicted by an optimality-theoretic factorial typology are variable/non-categorical: (</a:t>
+            </a:r>
+            <a:r>
+              <a:rPr lang="en-US" dirty="0" err="1"/>
+              <a:t>i</a:t>
+            </a:r>
+            <a:r>
+              <a:rPr lang="en-US" dirty="0"/>
+              <a:t>) Onset, </a:t>
+            </a:r>
+            <a:r>
+              <a:rPr lang="en-US" u="sng" dirty="0"/>
+              <a:t>*Onset/glide &gt;&gt; *Complex </a:t>
+            </a:r>
+            <a:r>
+              <a:rPr lang="en-US" u="sng" dirty="0" err="1"/>
+              <a:t>Nuc</a:t>
+            </a:r>
+            <a:r>
+              <a:rPr lang="en-US" dirty="0"/>
+              <a:t>, Max-IO𝝻, Ident(cons) (nuclear glide) (ii) Onset, *</a:t>
+            </a:r>
+            <a:r>
+              <a:rPr lang="en-US" u="sng" dirty="0"/>
+              <a:t>Complex </a:t>
+            </a:r>
+            <a:r>
+              <a:rPr lang="en-US" u="sng" dirty="0" err="1"/>
+              <a:t>Nuc</a:t>
+            </a:r>
+            <a:r>
+              <a:rPr lang="en-US" u="sng" dirty="0"/>
+              <a:t> &gt;&gt; *Onset/glide</a:t>
+            </a:r>
+            <a:r>
+              <a:rPr lang="en-US" dirty="0"/>
+              <a:t>, Max-IO𝝻, Ident(cons) (onset glide) (</a:t>
+            </a:r>
+            <a:r>
+              <a:rPr lang="en-US" dirty="0" err="1"/>
+              <a:t>Colina</a:t>
+            </a:r>
+            <a:r>
+              <a:rPr lang="en-US" dirty="0"/>
+              <a:t> 2009).  This</a:t>
+            </a:r>
+          </a:p>
+          <a:p>
+            <a:r>
+              <a:rPr lang="en-US" dirty="0"/>
+              <a:t>The variable, non-categorical rankings above (underlined) can be modelled in stochastic OT (Boersma and Hayes 2001 )</a:t>
+            </a:r>
+          </a:p>
+          <a:p>
+            <a:r>
+              <a:rPr lang="en-US" dirty="0"/>
+              <a:t>Further research is needed to study the factors conditioning the variation (they do not appear to be phonological)</a:t>
+            </a:r>
+          </a:p>
+          <a:p>
+            <a:r>
+              <a:rPr lang="en-US" dirty="0"/>
+              <a:t>This study could be replicated </a:t>
+            </a:r>
+            <a:r>
+              <a:rPr lang="en-US"/>
+              <a:t>with more </a:t>
+            </a:r>
+            <a:r>
+              <a:rPr lang="en-US" dirty="0"/>
+              <a:t>subjects (controlled by sex, age, linguistic profile), and, for comparative purposes,  also with speakers of dialects that do not allow onset glides.</a:t>
+            </a:r>
+          </a:p>
+        </p:txBody>
+      </p:sp>
+    </p:spTree>
+    <p:extLst>
+      <p:ext uri="{BB962C8B-B14F-4D97-AF65-F5344CB8AC3E}">
+        <p14:creationId xmlns:p14="http://schemas.microsoft.com/office/powerpoint/2010/main" val="566273899"/>
+      </p:ext>
+    </p:extLst>
+  </p:cSld>
+  <p:clrMapOvr>
+    <a:masterClrMapping/>
+  </p:clrMapOvr>
+</p:sld>
+</file>
+
+<file path=ppt/slides/slide28.xml><?xml version="1.0" encoding="utf-8"?>
+<p:sld xmlns:a="http://schemas.openxmlformats.org/drawingml/2006/main" xmlns:r="http://schemas.openxmlformats.org/officeDocument/2006/relationships" xmlns:p="http://schemas.openxmlformats.org/presentationml/2006/main">
+  <p:cSld>
+    <p:spTree>
+      <p:nvGrpSpPr>
+        <p:cNvPr id="1" name=""/>
+        <p:cNvGrpSpPr/>
+        <p:nvPr/>
+      </p:nvGrpSpPr>
+      <p:grpSpPr>
+        <a:xfrm>
+          <a:off x="0" y="0"/>
+          <a:ext cx="0" cy="0"/>
+          <a:chOff x="0" y="0"/>
+          <a:chExt cx="0" cy="0"/>
+        </a:xfrm>
+      </p:grpSpPr>
+      <p:sp>
+        <p:nvSpPr>
+          <p:cNvPr id="2" name="Title 1"/>
+          <p:cNvSpPr>
+            <a:spLocks noGrp="1"/>
+          </p:cNvSpPr>
+          <p:nvPr>
+            <p:ph type="title"/>
+          </p:nvPr>
+        </p:nvSpPr>
+        <p:spPr/>
+        <p:txBody>
+          <a:bodyPr/>
+          <a:lstStyle/>
+          <a:p>
+            <a:r>
+              <a:rPr lang="en-US" dirty="0"/>
+              <a:t>Conclusion</a:t>
+            </a:r>
+          </a:p>
+        </p:txBody>
+      </p:sp>
+      <p:sp>
+        <p:nvSpPr>
+          <p:cNvPr id="3" name="Content Placeholder 2"/>
+          <p:cNvSpPr>
+            <a:spLocks noGrp="1"/>
+          </p:cNvSpPr>
+          <p:nvPr>
+            <p:ph idx="1"/>
+          </p:nvPr>
+        </p:nvSpPr>
+        <p:spPr/>
+        <p:txBody>
+          <a:bodyPr>
+            <a:normAutofit fontScale="92500"/>
+          </a:bodyPr>
+          <a:lstStyle/>
+          <a:p>
+            <a:r>
+              <a:rPr lang="en-US" dirty="0"/>
+              <a:t>In this study we examined the syllabic affiliation of prevocalic glides in Sonoran Spanish</a:t>
+            </a:r>
+          </a:p>
+          <a:p>
+            <a:r>
+              <a:rPr lang="en-US" dirty="0"/>
+              <a:t>Since glides are licit in the onset (i.e., no onset strengthening in Sonoran Spanish), a postconsonantal, prevocalic glide could be parsed as the second segment of a complex onset in Sonoran Spanish.</a:t>
+            </a:r>
+          </a:p>
+          <a:p>
+            <a:r>
+              <a:rPr lang="en-US" dirty="0"/>
+              <a:t>Experimental evidence showed that Sonoran speakers produced the GVG sequence at least some of the time (thus it is possible). Acoustic analysis shows that pre-vocalic segments are longer after palatal consonants; the duration increase is shown to be due to lengthening of onset (a strategy to avoid illicit sequence).</a:t>
+            </a:r>
+          </a:p>
+          <a:p>
+            <a:r>
+              <a:rPr lang="en-US" dirty="0"/>
+              <a:t>Glides can be variably parsed as C2 in a complex onset.   Onset glides in Sonoran Spanish provide evidence for cross-dialectal and intra-dialectal variation in syllabic affiliation.</a:t>
+            </a:r>
+          </a:p>
+        </p:txBody>
+      </p:sp>
+    </p:spTree>
+    <p:extLst>
+      <p:ext uri="{BB962C8B-B14F-4D97-AF65-F5344CB8AC3E}">
+        <p14:creationId xmlns:p14="http://schemas.microsoft.com/office/powerpoint/2010/main" val="1826730619"/>
+      </p:ext>
+    </p:extLst>
+  </p:cSld>
+  <p:clrMapOvr>
+    <a:masterClrMapping/>
+  </p:clrMapOvr>
+</p:sld>
+</file>
+
+<file path=ppt/slides/slide29.xml><?xml version="1.0" encoding="utf-8"?>
+<p:sld xmlns:a="http://schemas.openxmlformats.org/drawingml/2006/main" xmlns:r="http://schemas.openxmlformats.org/officeDocument/2006/relationships" xmlns:p="http://schemas.openxmlformats.org/presentationml/2006/main">
+  <p:cSld>
+    <p:spTree>
+      <p:nvGrpSpPr>
+        <p:cNvPr id="1" name=""/>
+        <p:cNvGrpSpPr/>
+        <p:nvPr/>
+      </p:nvGrpSpPr>
+      <p:grpSpPr>
+        <a:xfrm>
+          <a:off x="0" y="0"/>
+          <a:ext cx="0" cy="0"/>
+          <a:chOff x="0" y="0"/>
+          <a:chExt cx="0" cy="0"/>
+        </a:xfrm>
+      </p:grpSpPr>
+      <p:sp>
+        <p:nvSpPr>
+          <p:cNvPr id="2" name="Title 1"/>
+          <p:cNvSpPr>
+            <a:spLocks noGrp="1"/>
+          </p:cNvSpPr>
+          <p:nvPr>
+            <p:ph type="title"/>
+          </p:nvPr>
+        </p:nvSpPr>
+        <p:spPr/>
+        <p:txBody>
+          <a:bodyPr/>
+          <a:lstStyle/>
+          <a:p>
+            <a:r>
+              <a:rPr lang="en-US" dirty="0"/>
               <a:t>References</a:t>
             </a:r>
           </a:p>
@@ -7494,7 +7718,7 @@
         </p:spPr>
         <p:txBody>
           <a:bodyPr>
-            <a:normAutofit fontScale="92500" lnSpcReduction="20000"/>
+            <a:normAutofit fontScale="85000" lnSpcReduction="10000"/>
           </a:bodyPr>
           <a:lstStyle/>
           <a:p>
@@ -7522,6 +7746,70 @@
           <a:p>
             <a:r>
               <a:rPr lang="en-US" cap="small" dirty="0"/>
+              <a:t>Boersma, P. </a:t>
+            </a:r>
+            <a:r>
+              <a:rPr lang="en-US" dirty="0"/>
+              <a:t>and</a:t>
+            </a:r>
+            <a:r>
+              <a:rPr lang="en-US" cap="small" dirty="0"/>
+              <a:t> Hayes, B</a:t>
+            </a:r>
+            <a:r>
+              <a:rPr lang="en-US" dirty="0"/>
+              <a:t>. 2001.  Empirical tests of the Gradual Learning Algorithm. </a:t>
+            </a:r>
+            <a:r>
+              <a:rPr lang="en-US" i="1" dirty="0"/>
+              <a:t>Linguistic Inquiry</a:t>
+            </a:r>
+            <a:r>
+              <a:rPr lang="en-US" dirty="0"/>
+              <a:t> 32. 45-86.</a:t>
+            </a:r>
+          </a:p>
+          <a:p>
+            <a:r>
+              <a:rPr lang="en-US" cap="small" dirty="0"/>
+              <a:t>Boersma</a:t>
+            </a:r>
+            <a:r>
+              <a:rPr lang="en-US" dirty="0"/>
+              <a:t>, P. &amp; </a:t>
+            </a:r>
+            <a:r>
+              <a:rPr lang="en-US" cap="small" dirty="0" err="1"/>
+              <a:t>Weenink</a:t>
+            </a:r>
+            <a:r>
+              <a:rPr lang="en-US" dirty="0"/>
+              <a:t>, D. (2018). </a:t>
+            </a:r>
+            <a:r>
+              <a:rPr lang="en-US" i="1" dirty="0" err="1"/>
+              <a:t>Praat</a:t>
+            </a:r>
+            <a:r>
+              <a:rPr lang="en-US" i="1" dirty="0"/>
+              <a:t>: doing phonetics by computer</a:t>
+            </a:r>
+            <a:r>
+              <a:rPr lang="en-US" dirty="0"/>
+              <a:t>. Version 6.0.39, retrieved 3 April 2018 from http://</a:t>
+            </a:r>
+            <a:r>
+              <a:rPr lang="en-US" dirty="0" err="1"/>
+              <a:t>www.praat.org</a:t>
+            </a:r>
+            <a:r>
+              <a:rPr lang="en-US" dirty="0"/>
+              <a:t>/.</a:t>
+            </a:r>
+          </a:p>
+          <a:p>
+            <a:r>
+              <a:rPr lang="en-US" cap="small" dirty="0"/>
               <a:t>Canfield</a:t>
             </a:r>
             <a:r>
@@ -7670,44 +7958,6 @@
             <a:r>
               <a:rPr lang="en-US" dirty="0"/>
               <a:t>Washington, DC: Georgetown UP, pp. 195-215.</a:t>
-            </a:r>
-          </a:p>
-          <a:p>
-            <a:r>
-              <a:rPr lang="en-US" cap="small" dirty="0"/>
-              <a:t>Boersma</a:t>
-            </a:r>
-            <a:r>
-              <a:rPr lang="en-US" dirty="0"/>
-              <a:t>, P. &amp; </a:t>
-            </a:r>
-            <a:r>
-              <a:rPr lang="en-US" cap="small" dirty="0" err="1"/>
-              <a:t>Weenink</a:t>
-            </a:r>
-            <a:r>
-              <a:rPr lang="en-US" dirty="0"/>
-              <a:t>, D. (2018). </a:t>
-            </a:r>
-            <a:r>
-              <a:rPr lang="en-US" i="1" dirty="0" err="1"/>
-              <a:t>Praat</a:t>
-            </a:r>
-            <a:r>
-              <a:rPr lang="en-US" i="1" dirty="0"/>
-              <a:t>: doing phonetics by computer</a:t>
-            </a:r>
-            <a:r>
-              <a:rPr lang="en-US" dirty="0"/>
-              <a:t>. Version 6.0.39, retrieved 3 April 2018 from http://</a:t>
-            </a:r>
-            <a:r>
-              <a:rPr lang="en-US" dirty="0" err="1"/>
-              <a:t>www.praat.org</a:t>
-            </a:r>
-            <a:r>
-              <a:rPr lang="en-US" dirty="0"/>
-              <a:t>/.</a:t>
             </a:r>
           </a:p>
           <a:p>
@@ -7731,17 +7981,244 @@
   <p:clrMapOvr>
     <a:masterClrMapping/>
   </p:clrMapOvr>
-  <p:timing>
-    <p:tnLst>
-      <p:par>
-        <p:cTn id="1" dur="indefinite" restart="never" nodeType="tmRoot"/>
-      </p:par>
-    </p:tnLst>
-  </p:timing>
 </p:sld>
 </file>
 
-<file path=ppt/slides/slide28.xml><?xml version="1.0" encoding="utf-8"?>
+<file path=ppt/slides/slide3.xml><?xml version="1.0" encoding="utf-8"?>
+<p:sld xmlns:a="http://schemas.openxmlformats.org/drawingml/2006/main" xmlns:r="http://schemas.openxmlformats.org/officeDocument/2006/relationships" xmlns:p="http://schemas.openxmlformats.org/presentationml/2006/main">
+  <p:cSld>
+    <p:spTree>
+      <p:nvGrpSpPr>
+        <p:cNvPr id="1" name=""/>
+        <p:cNvGrpSpPr/>
+        <p:nvPr/>
+      </p:nvGrpSpPr>
+      <p:grpSpPr>
+        <a:xfrm>
+          <a:off x="0" y="0"/>
+          <a:ext cx="0" cy="0"/>
+          <a:chOff x="0" y="0"/>
+          <a:chExt cx="0" cy="0"/>
+        </a:xfrm>
+      </p:grpSpPr>
+      <p:sp>
+        <p:nvSpPr>
+          <p:cNvPr id="2" name="Title 1">
+            <a:extLst>
+              <a:ext uri="{FF2B5EF4-FFF2-40B4-BE49-F238E27FC236}">
+                <a16:creationId xmlns:a16="http://schemas.microsoft.com/office/drawing/2014/main" xmlns="" id="{A07010FC-4E57-DB4A-AE74-BB164736ED48}"/>
+              </a:ext>
+            </a:extLst>
+          </p:cNvPr>
+          <p:cNvSpPr>
+            <a:spLocks noGrp="1"/>
+          </p:cNvSpPr>
+          <p:nvPr>
+            <p:ph type="title"/>
+          </p:nvPr>
+        </p:nvSpPr>
+        <p:spPr/>
+        <p:txBody>
+          <a:bodyPr/>
+          <a:lstStyle/>
+          <a:p>
+            <a:r>
+              <a:rPr lang="en-US" dirty="0"/>
+              <a:t>Background</a:t>
+            </a:r>
+          </a:p>
+        </p:txBody>
+      </p:sp>
+      <p:sp>
+        <p:nvSpPr>
+          <p:cNvPr id="3" name="Content Placeholder 2">
+            <a:extLst>
+              <a:ext uri="{FF2B5EF4-FFF2-40B4-BE49-F238E27FC236}">
+                <a16:creationId xmlns:a16="http://schemas.microsoft.com/office/drawing/2014/main" xmlns="" id="{16E71D18-0184-8E49-B2DD-4AC61CABB8F7}"/>
+              </a:ext>
+            </a:extLst>
+          </p:cNvPr>
+          <p:cNvSpPr>
+            <a:spLocks noGrp="1"/>
+          </p:cNvSpPr>
+          <p:nvPr>
+            <p:ph sz="half" idx="1"/>
+          </p:nvPr>
+        </p:nvSpPr>
+        <p:spPr>
+          <a:xfrm>
+            <a:off x="457200" y="2863516"/>
+            <a:ext cx="3657600" cy="3262964"/>
+          </a:xfrm>
+        </p:spPr>
+        <p:txBody>
+          <a:bodyPr>
+            <a:normAutofit/>
+          </a:bodyPr>
+          <a:lstStyle/>
+          <a:p>
+            <a:endParaRPr lang="en-US" dirty="0"/>
+          </a:p>
+          <a:p>
+            <a:endParaRPr lang="en-US" dirty="0"/>
+          </a:p>
+        </p:txBody>
+      </p:sp>
+      <p:pic>
+        <p:nvPicPr>
+          <p:cNvPr id="27" name="Content Placeholder 26">
+            <a:extLst>
+              <a:ext uri="{FF2B5EF4-FFF2-40B4-BE49-F238E27FC236}">
+                <a16:creationId xmlns:a16="http://schemas.microsoft.com/office/drawing/2014/main" xmlns="" id="{D2063125-9A3E-4441-BD2E-7ECF40AA8583}"/>
+              </a:ext>
+            </a:extLst>
+          </p:cNvPr>
+          <p:cNvPicPr>
+            <a:picLocks noGrp="1" noChangeAspect="1"/>
+          </p:cNvPicPr>
+          <p:nvPr>
+            <p:ph sz="half" idx="2"/>
+          </p:nvPr>
+        </p:nvPicPr>
+        <p:blipFill>
+          <a:blip r:embed="rId2">
+            <a:extLst>
+              <a:ext uri="{28A0092B-C50C-407E-A947-70E740481C1C}">
+                <a14:useLocalDpi xmlns:a14="http://schemas.microsoft.com/office/drawing/2010/main" val="0"/>
+              </a:ext>
+            </a:extLst>
+          </a:blip>
+          <a:stretch>
+            <a:fillRect/>
+          </a:stretch>
+        </p:blipFill>
+        <p:spPr>
+          <a:xfrm>
+            <a:off x="457200" y="3018076"/>
+            <a:ext cx="3657600" cy="2421583"/>
+          </a:xfrm>
+        </p:spPr>
+      </p:pic>
+      <p:sp>
+        <p:nvSpPr>
+          <p:cNvPr id="24" name="TextBox 23">
+            <a:extLst>
+              <a:ext uri="{FF2B5EF4-FFF2-40B4-BE49-F238E27FC236}">
+                <a16:creationId xmlns:a16="http://schemas.microsoft.com/office/drawing/2014/main" xmlns="" id="{37DBAD5E-8726-834E-B8EF-F21E7CBEA464}"/>
+              </a:ext>
+            </a:extLst>
+          </p:cNvPr>
+          <p:cNvSpPr txBox="1"/>
+          <p:nvPr/>
+        </p:nvSpPr>
+        <p:spPr>
+          <a:xfrm>
+            <a:off x="565484" y="1417638"/>
+            <a:ext cx="7511715" cy="1908215"/>
+          </a:xfrm>
+          <a:prstGeom prst="rect">
+            <a:avLst/>
+          </a:prstGeom>
+          <a:noFill/>
+        </p:spPr>
+        <p:txBody>
+          <a:bodyPr wrap="square" rtlCol="0">
+            <a:spAutoFit/>
+          </a:bodyPr>
+          <a:lstStyle/>
+          <a:p>
+            <a:r>
+              <a:rPr lang="en-US" sz="2000" dirty="0"/>
+              <a:t>The standard position in the literature (Harris &amp; </a:t>
+            </a:r>
+            <a:r>
+              <a:rPr lang="en-US" sz="2000" dirty="0" err="1"/>
+              <a:t>Kaisse</a:t>
+            </a:r>
+            <a:r>
+              <a:rPr lang="en-US" sz="2000" dirty="0"/>
+              <a:t> 1999; </a:t>
+            </a:r>
+            <a:r>
+              <a:rPr lang="en-US" sz="2000" dirty="0" err="1"/>
+              <a:t>Hualde</a:t>
+            </a:r>
+            <a:r>
+              <a:rPr lang="en-US" sz="2000" dirty="0"/>
+              <a:t> 2005, 2014; </a:t>
+            </a:r>
+            <a:r>
+              <a:rPr lang="en-US" sz="2000" dirty="0" err="1"/>
+              <a:t>Colina</a:t>
+            </a:r>
+            <a:r>
+              <a:rPr lang="en-US" sz="2000" dirty="0"/>
+              <a:t> 2009, and many others</a:t>
+            </a:r>
+            <a:r>
+              <a:rPr lang="en-US" dirty="0"/>
+              <a:t>) </a:t>
+            </a:r>
+            <a:r>
+              <a:rPr lang="en-US" sz="2000" dirty="0"/>
+              <a:t>is that postconsonantal, prevocalic glides are parsed in the nucleus of the syllable, when there is a preceding consonant that occupies the onset, i.e., (1a) rather than (1b) (however, cf. Martínez-Gil 2016 for arguments for 1b)</a:t>
+            </a:r>
+          </a:p>
+          <a:p>
+            <a:endParaRPr lang="en-US" dirty="0"/>
+          </a:p>
+        </p:txBody>
+      </p:sp>
+      <p:pic>
+        <p:nvPicPr>
+          <p:cNvPr id="29" name="Picture 28">
+            <a:extLst>
+              <a:ext uri="{FF2B5EF4-FFF2-40B4-BE49-F238E27FC236}">
+                <a16:creationId xmlns:a16="http://schemas.microsoft.com/office/drawing/2014/main" xmlns="" id="{05786AA7-A6D4-C540-A3E5-537391730D62}"/>
+              </a:ext>
+            </a:extLst>
+          </p:cNvPr>
+          <p:cNvPicPr>
+            <a:picLocks noChangeAspect="1"/>
+          </p:cNvPicPr>
+          <p:nvPr/>
+        </p:nvPicPr>
+        <p:blipFill>
+          <a:blip r:embed="rId3">
+            <a:extLst>
+              <a:ext uri="{28A0092B-C50C-407E-A947-70E740481C1C}">
+                <a14:useLocalDpi xmlns:a14="http://schemas.microsoft.com/office/drawing/2010/main" val="0"/>
+              </a:ext>
+            </a:extLst>
+          </a:blip>
+          <a:stretch>
+            <a:fillRect/>
+          </a:stretch>
+        </p:blipFill>
+        <p:spPr>
+          <a:xfrm>
+            <a:off x="3932655" y="3030776"/>
+            <a:ext cx="3949700" cy="2260600"/>
+          </a:xfrm>
+          <a:prstGeom prst="rect">
+            <a:avLst/>
+          </a:prstGeom>
+        </p:spPr>
+      </p:pic>
+    </p:spTree>
+    <p:extLst>
+      <p:ext uri="{BB962C8B-B14F-4D97-AF65-F5344CB8AC3E}">
+        <p14:creationId xmlns:p14="http://schemas.microsoft.com/office/powerpoint/2010/main" val="2100315245"/>
+      </p:ext>
+    </p:extLst>
+  </p:cSld>
+  <p:clrMapOvr>
+    <a:masterClrMapping/>
+  </p:clrMapOvr>
+</p:sld>
+</file>
+
+<file path=ppt/slides/slide30.xml><?xml version="1.0" encoding="utf-8"?>
 <p:sld xmlns:a="http://schemas.openxmlformats.org/drawingml/2006/main" xmlns:r="http://schemas.openxmlformats.org/officeDocument/2006/relationships" xmlns:p="http://schemas.openxmlformats.org/presentationml/2006/main" showMasterSp="0">
   <p:cSld>
     <p:bg>
@@ -7809,240 +8286,6 @@
 </p:sld>
 </file>
 
-<file path=ppt/slides/slide3.xml><?xml version="1.0" encoding="utf-8"?>
-<p:sld xmlns:a="http://schemas.openxmlformats.org/drawingml/2006/main" xmlns:r="http://schemas.openxmlformats.org/officeDocument/2006/relationships" xmlns:p="http://schemas.openxmlformats.org/presentationml/2006/main">
-  <p:cSld>
-    <p:spTree>
-      <p:nvGrpSpPr>
-        <p:cNvPr id="1" name=""/>
-        <p:cNvGrpSpPr/>
-        <p:nvPr/>
-      </p:nvGrpSpPr>
-      <p:grpSpPr>
-        <a:xfrm>
-          <a:off x="0" y="0"/>
-          <a:ext cx="0" cy="0"/>
-          <a:chOff x="0" y="0"/>
-          <a:chExt cx="0" cy="0"/>
-        </a:xfrm>
-      </p:grpSpPr>
-      <p:sp>
-        <p:nvSpPr>
-          <p:cNvPr id="2" name="Title 1">
-            <a:extLst>
-              <a:ext uri="{FF2B5EF4-FFF2-40B4-BE49-F238E27FC236}">
-                <a16:creationId xmlns:a16="http://schemas.microsoft.com/office/drawing/2014/main" xmlns="" id="{A07010FC-4E57-DB4A-AE74-BB164736ED48}"/>
-              </a:ext>
-            </a:extLst>
-          </p:cNvPr>
-          <p:cNvSpPr>
-            <a:spLocks noGrp="1"/>
-          </p:cNvSpPr>
-          <p:nvPr>
-            <p:ph type="title"/>
-          </p:nvPr>
-        </p:nvSpPr>
-        <p:spPr/>
-        <p:txBody>
-          <a:bodyPr/>
-          <a:lstStyle/>
-          <a:p>
-            <a:r>
-              <a:rPr lang="en-US" dirty="0"/>
-              <a:t>Background</a:t>
-            </a:r>
-          </a:p>
-        </p:txBody>
-      </p:sp>
-      <p:sp>
-        <p:nvSpPr>
-          <p:cNvPr id="3" name="Content Placeholder 2">
-            <a:extLst>
-              <a:ext uri="{FF2B5EF4-FFF2-40B4-BE49-F238E27FC236}">
-                <a16:creationId xmlns:a16="http://schemas.microsoft.com/office/drawing/2014/main" xmlns="" id="{16E71D18-0184-8E49-B2DD-4AC61CABB8F7}"/>
-              </a:ext>
-            </a:extLst>
-          </p:cNvPr>
-          <p:cNvSpPr>
-            <a:spLocks noGrp="1"/>
-          </p:cNvSpPr>
-          <p:nvPr>
-            <p:ph sz="half" idx="1"/>
-          </p:nvPr>
-        </p:nvSpPr>
-        <p:spPr>
-          <a:xfrm>
-            <a:off x="457200" y="2863516"/>
-            <a:ext cx="3657600" cy="3262964"/>
-          </a:xfrm>
-        </p:spPr>
-        <p:txBody>
-          <a:bodyPr>
-            <a:normAutofit/>
-          </a:bodyPr>
-          <a:lstStyle/>
-          <a:p>
-            <a:endParaRPr lang="en-US" dirty="0"/>
-          </a:p>
-          <a:p>
-            <a:endParaRPr lang="en-US" dirty="0"/>
-          </a:p>
-        </p:txBody>
-      </p:sp>
-      <p:pic>
-        <p:nvPicPr>
-          <p:cNvPr id="27" name="Content Placeholder 26">
-            <a:extLst>
-              <a:ext uri="{FF2B5EF4-FFF2-40B4-BE49-F238E27FC236}">
-                <a16:creationId xmlns:a16="http://schemas.microsoft.com/office/drawing/2014/main" xmlns="" id="{D2063125-9A3E-4441-BD2E-7ECF40AA8583}"/>
-              </a:ext>
-            </a:extLst>
-          </p:cNvPr>
-          <p:cNvPicPr>
-            <a:picLocks noGrp="1" noChangeAspect="1"/>
-          </p:cNvPicPr>
-          <p:nvPr>
-            <p:ph sz="half" idx="2"/>
-          </p:nvPr>
-        </p:nvPicPr>
-        <p:blipFill>
-          <a:blip r:embed="rId2">
-            <a:extLst>
-              <a:ext uri="{28A0092B-C50C-407E-A947-70E740481C1C}">
-                <a14:useLocalDpi xmlns:a14="http://schemas.microsoft.com/office/drawing/2010/main" val="0"/>
-              </a:ext>
-            </a:extLst>
-          </a:blip>
-          <a:stretch>
-            <a:fillRect/>
-          </a:stretch>
-        </p:blipFill>
-        <p:spPr>
-          <a:xfrm>
-            <a:off x="457200" y="3018076"/>
-            <a:ext cx="3657600" cy="2421583"/>
-          </a:xfrm>
-        </p:spPr>
-      </p:pic>
-      <p:sp>
-        <p:nvSpPr>
-          <p:cNvPr id="24" name="TextBox 23">
-            <a:extLst>
-              <a:ext uri="{FF2B5EF4-FFF2-40B4-BE49-F238E27FC236}">
-                <a16:creationId xmlns:a16="http://schemas.microsoft.com/office/drawing/2014/main" xmlns="" id="{37DBAD5E-8726-834E-B8EF-F21E7CBEA464}"/>
-              </a:ext>
-            </a:extLst>
-          </p:cNvPr>
-          <p:cNvSpPr txBox="1"/>
-          <p:nvPr/>
-        </p:nvSpPr>
-        <p:spPr>
-          <a:xfrm>
-            <a:off x="565484" y="1417638"/>
-            <a:ext cx="7511715" cy="1908215"/>
-          </a:xfrm>
-          <a:prstGeom prst="rect">
-            <a:avLst/>
-          </a:prstGeom>
-          <a:noFill/>
-        </p:spPr>
-        <p:txBody>
-          <a:bodyPr wrap="square" rtlCol="0">
-            <a:spAutoFit/>
-          </a:bodyPr>
-          <a:lstStyle/>
-          <a:p>
-            <a:r>
-              <a:rPr lang="en-US" sz="2000" dirty="0"/>
-              <a:t>The standard position in the literature (Harris &amp; </a:t>
-            </a:r>
-            <a:r>
-              <a:rPr lang="en-US" sz="2000" dirty="0" err="1"/>
-              <a:t>Kaisse</a:t>
-            </a:r>
-            <a:r>
-              <a:rPr lang="en-US" sz="2000" dirty="0"/>
-              <a:t> 1999; </a:t>
-            </a:r>
-            <a:r>
-              <a:rPr lang="en-US" sz="2000" dirty="0" err="1"/>
-              <a:t>Hualde</a:t>
-            </a:r>
-            <a:r>
-              <a:rPr lang="en-US" sz="2000" dirty="0"/>
-              <a:t> 2005, 2014; </a:t>
-            </a:r>
-            <a:r>
-              <a:rPr lang="en-US" sz="2000" dirty="0" err="1"/>
-              <a:t>Colina</a:t>
-            </a:r>
-            <a:r>
-              <a:rPr lang="en-US" sz="2000" dirty="0"/>
-              <a:t> 2009, and many others</a:t>
-            </a:r>
-            <a:r>
-              <a:rPr lang="en-US" dirty="0"/>
-              <a:t>) </a:t>
-            </a:r>
-            <a:r>
-              <a:rPr lang="en-US" sz="2000" dirty="0"/>
-              <a:t>is that postconsonantal, prevocalic glides are parsed in the nucleus of the syllable, when there is a preceding consonant that occupies the onset, i.e., (1a) rather than (1b) (however, cf. Martínez-Gil 2016 for arguments for 1b)</a:t>
-            </a:r>
-          </a:p>
-          <a:p>
-            <a:endParaRPr lang="en-US" dirty="0"/>
-          </a:p>
-        </p:txBody>
-      </p:sp>
-      <p:pic>
-        <p:nvPicPr>
-          <p:cNvPr id="29" name="Picture 28">
-            <a:extLst>
-              <a:ext uri="{FF2B5EF4-FFF2-40B4-BE49-F238E27FC236}">
-                <a16:creationId xmlns:a16="http://schemas.microsoft.com/office/drawing/2014/main" xmlns="" id="{05786AA7-A6D4-C540-A3E5-537391730D62}"/>
-              </a:ext>
-            </a:extLst>
-          </p:cNvPr>
-          <p:cNvPicPr>
-            <a:picLocks noChangeAspect="1"/>
-          </p:cNvPicPr>
-          <p:nvPr/>
-        </p:nvPicPr>
-        <p:blipFill>
-          <a:blip r:embed="rId3">
-            <a:extLst>
-              <a:ext uri="{28A0092B-C50C-407E-A947-70E740481C1C}">
-                <a14:useLocalDpi xmlns:a14="http://schemas.microsoft.com/office/drawing/2010/main" val="0"/>
-              </a:ext>
-            </a:extLst>
-          </a:blip>
-          <a:stretch>
-            <a:fillRect/>
-          </a:stretch>
-        </p:blipFill>
-        <p:spPr>
-          <a:xfrm>
-            <a:off x="3932655" y="3030776"/>
-            <a:ext cx="3949700" cy="2260600"/>
-          </a:xfrm>
-          <a:prstGeom prst="rect">
-            <a:avLst/>
-          </a:prstGeom>
-        </p:spPr>
-      </p:pic>
-    </p:spTree>
-    <p:extLst>
-      <p:ext uri="{BB962C8B-B14F-4D97-AF65-F5344CB8AC3E}">
-        <p14:creationId xmlns:p14="http://schemas.microsoft.com/office/powerpoint/2010/main" val="2100315245"/>
-      </p:ext>
-    </p:extLst>
-  </p:cSld>
-  <p:clrMapOvr>
-    <a:masterClrMapping/>
-  </p:clrMapOvr>
-</p:sld>
-</file>
-
 <file path=ppt/slides/slide4.xml><?xml version="1.0" encoding="utf-8"?>
 <p:sld xmlns:a="http://schemas.openxmlformats.org/drawingml/2006/main" xmlns:r="http://schemas.openxmlformats.org/officeDocument/2006/relationships" xmlns:p="http://schemas.openxmlformats.org/presentationml/2006/main">
   <p:cSld>
@@ -8116,7 +8359,7 @@
           <a:p>
             <a:r>
               <a:rPr lang="en-US" dirty="0"/>
-              <a:t>In most varieties of Spanish, when the glide is prevocalic, but not postconsonantal (i.e., the onset is empty), the glide becomes an obstruent (with various degrees of aperture/constriction, e.g. approximant, fricative, stop, affricate) and it is parsed in the onset. .e., </a:t>
+              <a:t>In most varieties of Spanish, when the glide is prevocalic, but not postconsonantal (i.e., the onset is empty), the glide becomes an obstruent (with various degrees of aperture/constriction, e.g., approximant, fricative, stop, affricate) and it is parsed in the onset, e.g., </a:t>
             </a:r>
             <a:r>
               <a:rPr lang="en-US" i="1" dirty="0"/>
@@ -8136,7 +8379,7 @@
             </a:r>
             <a:r>
               <a:rPr lang="en-US" dirty="0"/>
-              <a:t>] ‘-</a:t>
+              <a:t>]  ‘-</a:t>
             </a:r>
             <a:r>
               <a:rPr lang="en-US" dirty="0" err="1"/>
@@ -8583,7 +8826,7 @@
           <a:p>
             <a:r>
               <a:rPr lang="en-US" dirty="0"/>
-              <a:t>Background</a:t>
+              <a:t>Research question/s</a:t>
             </a:r>
           </a:p>
         </p:txBody>
@@ -8611,7 +8854,7 @@
           <a:p>
             <a:r>
               <a:rPr lang="en-US" dirty="0"/>
-              <a:t>Is a postconsonantal, prevocalic glide parsed as the second segment of a complex onset in Sonoran Spanish?</a:t>
+              <a:t>Q1: Is a postconsonantal, prevocalic glide parsed as the second segment of a complex onset in Sonoran Spanish?</a:t>
             </a:r>
           </a:p>
           <a:p>
@@ -8623,7 +8866,7 @@
           <a:p>
             <a:r>
               <a:rPr lang="en-US" dirty="0"/>
-              <a:t>In more general terms, the question is: are prevocalic glides always part of an onset or can the glide be parsed in a complex nucleus preceding a full vowel (in a diphthong)? </a:t>
+              <a:t>Q2: In more general terms, the question is: are Spanish prevocalic glides always part of a complex nucleus (preceding a full vowel, in a diphthong) or can the glide be parsed in the onset in some dialects?</a:t>
             </a:r>
           </a:p>
         </p:txBody>
@@ -8681,7 +8924,7 @@
           <a:p>
             <a:r>
               <a:rPr lang="en-US" dirty="0"/>
-              <a:t>Research question</a:t>
+              <a:t>Research question/s</a:t>
             </a:r>
           </a:p>
         </p:txBody>
@@ -8765,23 +9008,15 @@
             </a:r>
             <a:r>
               <a:rPr lang="en-US" cap="small" dirty="0"/>
-              <a:t>, </a:t>
-            </a:r>
-            <a:r>
-              <a:rPr lang="en-US" cap="small"/>
-              <a:t>Max</a:t>
-            </a:r>
-            <a:r>
-              <a:rPr lang="en-US"/>
+              <a:t>, Max</a:t>
+            </a:r>
+            <a:r>
+              <a:rPr lang="en-US" dirty="0"/>
               <a:t>-IO𝝻,</a:t>
             </a:r>
             <a:r>
-              <a:rPr lang="en-US" cap="small"/>
-              <a:t> </a:t>
-            </a:r>
-            <a:r>
               <a:rPr lang="en-US" cap="small" dirty="0"/>
-              <a:t>Ident</a:t>
+              <a:t> Ident</a:t>
             </a:r>
             <a:r>
               <a:rPr lang="en-US" dirty="0"/>
@@ -8930,7 +9165,7 @@
           <a:p>
             <a:r>
               <a:rPr lang="en-US" dirty="0"/>
-              <a:t>Oral data </a:t>
+              <a:t>Oral data</a:t>
             </a:r>
           </a:p>
           <a:p>

</xml_diff>

<commit_message>
update figs in readme
</commit_message>
<xml_diff>
--- a/Colina, Casillas & Díaz HLS 2018.pptx
+++ b/Colina, Casillas & Díaz HLS 2018.pptx
@@ -160,28 +160,10 @@
 
 <file path=ppt/commentAuthors.xml><?xml version="1.0" encoding="utf-8"?>
 <p:cmAuthorLst xmlns:a="http://schemas.openxmlformats.org/drawingml/2006/main" xmlns:r="http://schemas.openxmlformats.org/officeDocument/2006/relationships" xmlns:p="http://schemas.openxmlformats.org/presentationml/2006/main">
-  <p:cmAuthor id="1" name="Microsoft Office User" initials="Office" lastIdx="1" clrIdx="0">
-    <p:extLst>
-      <p:ext uri="{19B8F6BF-5375-455C-9EA6-DF929625EA0E}">
-        <p15:presenceInfo xmlns:p15="http://schemas.microsoft.com/office/powerpoint/2012/main" userId="" providerId=""/>
-      </p:ext>
-    </p:extLst>
+  <p:cmAuthor id="1" name="Microsoft Office User" initials="Office" lastIdx="2" clrIdx="0">
+    <p:extLst/>
   </p:cmAuthor>
 </p:cmAuthorLst>
-</file>
-
-<file path=ppt/comments/comment1.xml><?xml version="1.0" encoding="utf-8"?>
-<p:cmLst xmlns:a="http://schemas.openxmlformats.org/drawingml/2006/main" xmlns:r="http://schemas.openxmlformats.org/officeDocument/2006/relationships" xmlns:p="http://schemas.openxmlformats.org/presentationml/2006/main">
-  <p:cm authorId="1" dt="2018-10-21T14:39:11.007" idx="1">
-    <p:pos x="2839" y="1884"/>
-    <p:text>Incomplete sentence. Did you mean to delete this?</p:text>
-    <p:extLst>
-      <p:ext uri="{C676402C-5697-4E1C-873F-D02D1690AC5C}">
-        <p15:threadingInfo xmlns:p15="http://schemas.microsoft.com/office/powerpoint/2012/main" timeZoneBias="240"/>
-      </p:ext>
-    </p:extLst>
-  </p:cm>
-</p:cmLst>
 </file>
 
 <file path=ppt/handoutMasters/handoutMaster1.xml><?xml version="1.0" encoding="utf-8"?>
@@ -266,7 +248,7 @@
           <a:p>
             <a:fld id="{F7A997DC-2566-1F49-938B-F7FAC7252CD3}" type="datetimeFigureOut">
               <a:rPr lang="en-US" smtClean="0"/>
-              <a:t>10/21/18</a:t>
+              <a:t>10/22/18</a:t>
             </a:fld>
             <a:endParaRPr lang="en-US"/>
           </a:p>
@@ -431,7 +413,7 @@
           <a:p>
             <a:fld id="{52DA3CF6-9E1E-1346-B10E-CF7AE5F98066}" type="datetimeFigureOut">
               <a:rPr lang="en-US" smtClean="0"/>
-              <a:t>10/21/18</a:t>
+              <a:t>10/22/18</a:t>
             </a:fld>
             <a:endParaRPr lang="es-ES_tradnl"/>
           </a:p>
@@ -768,15 +750,7 @@
           <a:p>
             <a:r>
               <a:rPr lang="en-US" baseline="0" dirty="0"/>
-              <a:t>Second, are responses predicted by the type of glide </a:t>
-            </a:r>
-            <a:r>
-              <a:rPr lang="en-US" baseline="0" dirty="0" smtClean="0"/>
-              <a:t>or </a:t>
-            </a:r>
-            <a:r>
-              <a:rPr lang="en-US" baseline="0" dirty="0"/>
-              <a:t>the preceding consonant?</a:t>
+              <a:t>Second, are responses predicted by the type of glide or the preceding consonant?</a:t>
             </a:r>
           </a:p>
           <a:p>
@@ -963,6 +937,83 @@
           <a:bodyPr/>
           <a:lstStyle/>
           <a:p>
+            <a:r>
+              <a:rPr lang="en-US" sz="1200" b="0" i="0" u="none" strike="noStrike" kern="1200" dirty="0" err="1">
+                <a:solidFill>
+                  <a:schemeClr val="tx1"/>
+                </a:solidFill>
+                <a:effectLst/>
+                <a:latin typeface="+mn-lt"/>
+                <a:ea typeface="+mn-ea"/>
+                <a:cs typeface="+mn-cs"/>
+              </a:rPr>
+              <a:t>Datos</a:t>
+            </a:r>
+            <a:r>
+              <a:rPr lang="en-US" sz="1200" b="0" i="0" u="none" strike="noStrike" kern="1200" dirty="0">
+                <a:solidFill>
+                  <a:schemeClr val="tx1"/>
+                </a:solidFill>
+                <a:effectLst/>
+                <a:latin typeface="+mn-lt"/>
+                <a:ea typeface="+mn-ea"/>
+                <a:cs typeface="+mn-cs"/>
+              </a:rPr>
+              <a:t> sin labial + w: </a:t>
+            </a:r>
+          </a:p>
+          <a:p>
+            <a:r>
+              <a:rPr lang="en-US" sz="1200" b="1" kern="1200" dirty="0">
+                <a:solidFill>
+                  <a:schemeClr val="tx1"/>
+                </a:solidFill>
+                <a:effectLst/>
+                <a:latin typeface="+mn-lt"/>
+                <a:ea typeface="+mn-ea"/>
+                <a:cs typeface="+mn-cs"/>
+              </a:rPr>
+              <a:t>10 fewer diphthongs (22 &gt;&gt; 12)</a:t>
+            </a:r>
+          </a:p>
+          <a:p>
+            <a:r>
+              <a:rPr lang="en-US" sz="1200" b="1" kern="1200" dirty="0">
+                <a:solidFill>
+                  <a:schemeClr val="tx1"/>
+                </a:solidFill>
+                <a:effectLst/>
+                <a:latin typeface="+mn-lt"/>
+                <a:ea typeface="+mn-ea"/>
+                <a:cs typeface="+mn-cs"/>
+              </a:rPr>
+              <a:t>5 fewer hiatuses (12 &gt;7)</a:t>
+            </a:r>
+          </a:p>
+          <a:p>
+            <a:r>
+              <a:rPr lang="en-US" sz="1200" b="1" kern="1200" dirty="0">
+                <a:solidFill>
+                  <a:schemeClr val="tx1"/>
+                </a:solidFill>
+                <a:effectLst/>
+                <a:latin typeface="+mn-lt"/>
+                <a:ea typeface="+mn-ea"/>
+                <a:cs typeface="+mn-cs"/>
+              </a:rPr>
+              <a:t>3 fewer simplification (8 &gt; 5)</a:t>
+            </a:r>
+            <a:endParaRPr lang="en-US" sz="1200" kern="1200" dirty="0">
+              <a:solidFill>
+                <a:schemeClr val="tx1"/>
+              </a:solidFill>
+              <a:effectLst/>
+              <a:latin typeface="+mn-lt"/>
+              <a:ea typeface="+mn-ea"/>
+              <a:cs typeface="+mn-cs"/>
+            </a:endParaRPr>
+          </a:p>
+          <a:p>
             <a:endParaRPr lang="en-US" dirty="0"/>
           </a:p>
         </p:txBody>
@@ -1067,12 +1118,8 @@
           </a:p>
           <a:p>
             <a:r>
-              <a:rPr lang="en-US" baseline="0" dirty="0" smtClean="0"/>
-              <a:t>Glide type doesn’t </a:t>
-            </a:r>
-            <a:r>
               <a:rPr lang="en-US" baseline="0" dirty="0"/>
-              <a:t>matter (j is not different from w)</a:t>
+              <a:t>Glide type doesn’t matter (j is not different from w)</a:t>
             </a:r>
           </a:p>
           <a:p>
@@ -1354,10 +1401,6 @@
             </a:r>
           </a:p>
           <a:p>
-            <a:r>
-              <a:rPr lang="en-US" dirty="0"/>
-              <a:t/>
-            </a:r>
             <a:br>
               <a:rPr lang="en-US" dirty="0"/>
             </a:br>
@@ -2450,7 +2493,7 @@
             <a:fld id="{04AF466F-BDA4-4F18-9C7B-FF0A9A1B0E80}" type="datetime1">
               <a:rPr lang="en-US" smtClean="0"/>
               <a:pPr/>
-              <a:t>10/21/18</a:t>
+              <a:t>10/22/18</a:t>
             </a:fld>
             <a:endParaRPr lang="en-US"/>
           </a:p>
@@ -2617,7 +2660,7 @@
             <a:fld id="{58FB4290-6522-4139-852E-05BD9E7F0D2E}" type="datetime1">
               <a:rPr lang="en-US" smtClean="0"/>
               <a:pPr/>
-              <a:t>10/21/18</a:t>
+              <a:t>10/22/18</a:t>
             </a:fld>
             <a:endParaRPr lang="en-US"/>
           </a:p>
@@ -2794,7 +2837,7 @@
             <a:fld id="{AAB955F9-81EA-47C5-8059-9E5C2B437C70}" type="datetime1">
               <a:rPr lang="en-US" smtClean="0"/>
               <a:pPr/>
-              <a:t>10/21/18</a:t>
+              <a:t>10/22/18</a:t>
             </a:fld>
             <a:endParaRPr lang="en-US"/>
           </a:p>
@@ -2961,7 +3004,7 @@
             <a:fld id="{1CEF607B-A47E-422C-9BEF-122CCDB7C526}" type="datetime1">
               <a:rPr lang="en-US" smtClean="0"/>
               <a:pPr/>
-              <a:t>10/21/18</a:t>
+              <a:t>10/22/18</a:t>
             </a:fld>
             <a:endParaRPr lang="en-US"/>
           </a:p>
@@ -3204,7 +3247,7 @@
             <a:fld id="{63A9A7CB-BEE6-4F99-898E-913F06E8E125}" type="datetime1">
               <a:rPr lang="en-US" smtClean="0"/>
               <a:pPr/>
-              <a:t>10/21/18</a:t>
+              <a:t>10/22/18</a:t>
             </a:fld>
             <a:endParaRPr lang="en-US"/>
           </a:p>
@@ -3489,7 +3532,7 @@
             <a:fld id="{B6EE300C-6FC5-4FC3-AF1A-075E4F50620D}" type="datetime1">
               <a:rPr lang="en-US" smtClean="0"/>
               <a:pPr/>
-              <a:t>10/21/18</a:t>
+              <a:t>10/22/18</a:t>
             </a:fld>
             <a:endParaRPr lang="en-US"/>
           </a:p>
@@ -3920,7 +3963,7 @@
             <a:fld id="{F50D295D-4A77-4DEB-B04C-9F4282A8BC04}" type="datetime1">
               <a:rPr lang="en-US" smtClean="0"/>
               <a:pPr/>
-              <a:t>10/21/18</a:t>
+              <a:t>10/22/18</a:t>
             </a:fld>
             <a:endParaRPr lang="en-US"/>
           </a:p>
@@ -4035,7 +4078,7 @@
             <a:fld id="{02B28685-4D0C-42D5-8013-B5904CD1FCBC}" type="datetime1">
               <a:rPr lang="en-US" smtClean="0"/>
               <a:pPr/>
-              <a:t>10/21/18</a:t>
+              <a:t>10/22/18</a:t>
             </a:fld>
             <a:endParaRPr lang="en-US"/>
           </a:p>
@@ -4127,7 +4170,7 @@
             <a:fld id="{FDF226C0-9885-4BA9-BBFA-A52CBFEBB775}" type="datetime1">
               <a:rPr lang="en-US" smtClean="0"/>
               <a:pPr/>
-              <a:t>10/21/18</a:t>
+              <a:t>10/22/18</a:t>
             </a:fld>
             <a:endParaRPr lang="en-US"/>
           </a:p>
@@ -4318,7 +4361,7 @@
             <a:fld id="{EBEE1B38-C5EB-4D66-9137-0AFE9CDEDE8F}" type="datetime1">
               <a:rPr lang="en-US" smtClean="0"/>
               <a:pPr/>
-              <a:t>10/21/18</a:t>
+              <a:t>10/22/18</a:t>
             </a:fld>
             <a:endParaRPr lang="en-US"/>
           </a:p>
@@ -4638,7 +4681,7 @@
             <a:fld id="{327B613C-1AD7-49D3-885D-F654C5CDBAA6}" type="datetime1">
               <a:rPr lang="en-US" smtClean="0"/>
               <a:pPr/>
-              <a:t>10/21/18</a:t>
+              <a:t>10/22/18</a:t>
             </a:fld>
             <a:endParaRPr lang="en-US" dirty="0"/>
           </a:p>
@@ -5020,7 +5063,7 @@
             <a:fld id="{327B613C-1AD7-49D3-885D-F654C5CDBAA6}" type="datetime1">
               <a:rPr lang="en-US" smtClean="0"/>
               <a:pPr/>
-              <a:t>10/21/18</a:t>
+              <a:t>10/22/18</a:t>
             </a:fld>
             <a:endParaRPr lang="en-US" dirty="0"/>
           </a:p>
@@ -5482,7 +5525,7 @@
           <p:cNvPr id="2" name="Title 1">
             <a:extLst>
               <a:ext uri="{FF2B5EF4-FFF2-40B4-BE49-F238E27FC236}">
-                <a16:creationId xmlns:a16="http://schemas.microsoft.com/office/drawing/2014/main" xmlns="" id="{6CCAD466-EE8C-0B4E-B0DF-08BF74C467A5}"/>
+                <a16:creationId xmlns:a16="http://schemas.microsoft.com/office/drawing/2014/main" id="{6CCAD466-EE8C-0B4E-B0DF-08BF74C467A5}"/>
               </a:ext>
             </a:extLst>
           </p:cNvPr>
@@ -5510,7 +5553,7 @@
           <p:cNvPr id="3" name="Content Placeholder 2">
             <a:extLst>
               <a:ext uri="{FF2B5EF4-FFF2-40B4-BE49-F238E27FC236}">
-                <a16:creationId xmlns:a16="http://schemas.microsoft.com/office/drawing/2014/main" xmlns="" id="{E1802F1D-6C4A-BA4F-AFEA-EF28322B2A17}"/>
+                <a16:creationId xmlns:a16="http://schemas.microsoft.com/office/drawing/2014/main" id="{E1802F1D-6C4A-BA4F-AFEA-EF28322B2A17}"/>
               </a:ext>
             </a:extLst>
           </p:cNvPr>
@@ -6095,7 +6138,7 @@
       </p:grpSpPr>
       <p:pic>
         <p:nvPicPr>
-          <p:cNvPr id="3" name="Picture 2"/>
+          <p:cNvPr id="2" name="Picture 1"/>
           <p:cNvPicPr>
             <a:picLocks noChangeAspect="1"/>
           </p:cNvPicPr>
@@ -6163,7 +6206,7 @@
       </p:grpSpPr>
       <p:pic>
         <p:nvPicPr>
-          <p:cNvPr id="3" name="Picture 2"/>
+          <p:cNvPr id="2" name="Picture 1"/>
           <p:cNvPicPr>
             <a:picLocks noChangeAspect="1"/>
           </p:cNvPicPr>
@@ -6260,15 +6303,7 @@
           <a:p>
             <a:r>
               <a:rPr lang="en-US" dirty="0"/>
-              <a:t>Triphthongs were produced in approximately </a:t>
-            </a:r>
-            <a:r>
-              <a:rPr lang="en-US" dirty="0" smtClean="0"/>
-              <a:t>40% </a:t>
-            </a:r>
-            <a:r>
-              <a:rPr lang="en-US" dirty="0"/>
-              <a:t>of the targets. </a:t>
+              <a:t>Triphthongs were produced in approximately 40% of the targets. </a:t>
             </a:r>
           </a:p>
           <a:p>
@@ -6730,7 +6765,7 @@
           <p:cNvPr id="2" name="Title 1">
             <a:extLst>
               <a:ext uri="{FF2B5EF4-FFF2-40B4-BE49-F238E27FC236}">
-                <a16:creationId xmlns:a16="http://schemas.microsoft.com/office/drawing/2014/main" xmlns="" id="{75BAE48F-7BA8-7D40-81DC-62AD5141EADC}"/>
+                <a16:creationId xmlns:a16="http://schemas.microsoft.com/office/drawing/2014/main" id="{75BAE48F-7BA8-7D40-81DC-62AD5141EADC}"/>
               </a:ext>
             </a:extLst>
           </p:cNvPr>
@@ -6758,7 +6793,7 @@
           <p:cNvPr id="3" name="Content Placeholder 2">
             <a:extLst>
               <a:ext uri="{FF2B5EF4-FFF2-40B4-BE49-F238E27FC236}">
-                <a16:creationId xmlns:a16="http://schemas.microsoft.com/office/drawing/2014/main" xmlns="" id="{F058774F-FF51-0F4D-AB13-F19A0D6541AD}"/>
+                <a16:creationId xmlns:a16="http://schemas.microsoft.com/office/drawing/2014/main" id="{F058774F-FF51-0F4D-AB13-F19A0D6541AD}"/>
               </a:ext>
             </a:extLst>
           </p:cNvPr>
@@ -7565,7 +7600,7 @@
             </a:r>
             <a:r>
               <a:rPr lang="en-US" dirty="0"/>
-              <a:t> 2009).  This</a:t>
+              <a:t> 2009). </a:t>
             </a:r>
           </a:p>
           <a:p>
@@ -8040,7 +8075,7 @@
           <p:cNvPr id="2" name="Title 1">
             <a:extLst>
               <a:ext uri="{FF2B5EF4-FFF2-40B4-BE49-F238E27FC236}">
-                <a16:creationId xmlns:a16="http://schemas.microsoft.com/office/drawing/2014/main" xmlns="" id="{A07010FC-4E57-DB4A-AE74-BB164736ED48}"/>
+                <a16:creationId xmlns:a16="http://schemas.microsoft.com/office/drawing/2014/main" id="{A07010FC-4E57-DB4A-AE74-BB164736ED48}"/>
               </a:ext>
             </a:extLst>
           </p:cNvPr>
@@ -8068,7 +8103,7 @@
           <p:cNvPr id="3" name="Content Placeholder 2">
             <a:extLst>
               <a:ext uri="{FF2B5EF4-FFF2-40B4-BE49-F238E27FC236}">
-                <a16:creationId xmlns:a16="http://schemas.microsoft.com/office/drawing/2014/main" xmlns="" id="{16E71D18-0184-8E49-B2DD-4AC61CABB8F7}"/>
+                <a16:creationId xmlns:a16="http://schemas.microsoft.com/office/drawing/2014/main" id="{16E71D18-0184-8E49-B2DD-4AC61CABB8F7}"/>
               </a:ext>
             </a:extLst>
           </p:cNvPr>
@@ -8103,7 +8138,7 @@
           <p:cNvPr id="27" name="Content Placeholder 26">
             <a:extLst>
               <a:ext uri="{FF2B5EF4-FFF2-40B4-BE49-F238E27FC236}">
-                <a16:creationId xmlns:a16="http://schemas.microsoft.com/office/drawing/2014/main" xmlns="" id="{D2063125-9A3E-4441-BD2E-7ECF40AA8583}"/>
+                <a16:creationId xmlns:a16="http://schemas.microsoft.com/office/drawing/2014/main" id="{D2063125-9A3E-4441-BD2E-7ECF40AA8583}"/>
               </a:ext>
             </a:extLst>
           </p:cNvPr>
@@ -8138,7 +8173,7 @@
           <p:cNvPr id="24" name="TextBox 23">
             <a:extLst>
               <a:ext uri="{FF2B5EF4-FFF2-40B4-BE49-F238E27FC236}">
-                <a16:creationId xmlns:a16="http://schemas.microsoft.com/office/drawing/2014/main" xmlns="" id="{37DBAD5E-8726-834E-B8EF-F21E7CBEA464}"/>
+                <a16:creationId xmlns:a16="http://schemas.microsoft.com/office/drawing/2014/main" id="{37DBAD5E-8726-834E-B8EF-F21E7CBEA464}"/>
               </a:ext>
             </a:extLst>
           </p:cNvPr>
@@ -8208,7 +8243,7 @@
           <p:cNvPr id="29" name="Picture 28">
             <a:extLst>
               <a:ext uri="{FF2B5EF4-FFF2-40B4-BE49-F238E27FC236}">
-                <a16:creationId xmlns:a16="http://schemas.microsoft.com/office/drawing/2014/main" xmlns="" id="{05786AA7-A6D4-C540-A3E5-537391730D62}"/>
+                <a16:creationId xmlns:a16="http://schemas.microsoft.com/office/drawing/2014/main" id="{05786AA7-A6D4-C540-A3E5-537391730D62}"/>
               </a:ext>
             </a:extLst>
           </p:cNvPr>
@@ -8279,7 +8314,7 @@
       </p:grpSpPr>
       <p:pic>
         <p:nvPicPr>
-          <p:cNvPr id="3" name="Picture 2"/>
+          <p:cNvPr id="2" name="Picture 1"/>
           <p:cNvPicPr>
             <a:picLocks noChangeAspect="1"/>
           </p:cNvPicPr>
@@ -8342,7 +8377,7 @@
           <p:cNvPr id="2" name="Title 1">
             <a:extLst>
               <a:ext uri="{FF2B5EF4-FFF2-40B4-BE49-F238E27FC236}">
-                <a16:creationId xmlns:a16="http://schemas.microsoft.com/office/drawing/2014/main" xmlns="" id="{A07010FC-4E57-DB4A-AE74-BB164736ED48}"/>
+                <a16:creationId xmlns:a16="http://schemas.microsoft.com/office/drawing/2014/main" id="{A07010FC-4E57-DB4A-AE74-BB164736ED48}"/>
               </a:ext>
             </a:extLst>
           </p:cNvPr>
@@ -8370,7 +8405,7 @@
           <p:cNvPr id="3" name="Content Placeholder 2">
             <a:extLst>
               <a:ext uri="{FF2B5EF4-FFF2-40B4-BE49-F238E27FC236}">
-                <a16:creationId xmlns:a16="http://schemas.microsoft.com/office/drawing/2014/main" xmlns="" id="{16E71D18-0184-8E49-B2DD-4AC61CABB8F7}"/>
+                <a16:creationId xmlns:a16="http://schemas.microsoft.com/office/drawing/2014/main" id="{16E71D18-0184-8E49-B2DD-4AC61CABB8F7}"/>
               </a:ext>
             </a:extLst>
           </p:cNvPr>
@@ -8483,7 +8518,7 @@
           <p:cNvPr id="7" name="Picture 6">
             <a:extLst>
               <a:ext uri="{FF2B5EF4-FFF2-40B4-BE49-F238E27FC236}">
-                <a16:creationId xmlns:a16="http://schemas.microsoft.com/office/drawing/2014/main" xmlns="" id="{A1F2D7A7-65CB-2D48-B04A-968935368B24}"/>
+                <a16:creationId xmlns:a16="http://schemas.microsoft.com/office/drawing/2014/main" id="{A1F2D7A7-65CB-2D48-B04A-968935368B24}"/>
               </a:ext>
             </a:extLst>
           </p:cNvPr>
@@ -8549,7 +8584,7 @@
           <p:cNvPr id="2" name="Title 1">
             <a:extLst>
               <a:ext uri="{FF2B5EF4-FFF2-40B4-BE49-F238E27FC236}">
-                <a16:creationId xmlns:a16="http://schemas.microsoft.com/office/drawing/2014/main" xmlns="" id="{A07010FC-4E57-DB4A-AE74-BB164736ED48}"/>
+                <a16:creationId xmlns:a16="http://schemas.microsoft.com/office/drawing/2014/main" id="{A07010FC-4E57-DB4A-AE74-BB164736ED48}"/>
               </a:ext>
             </a:extLst>
           </p:cNvPr>
@@ -8577,7 +8612,7 @@
           <p:cNvPr id="3" name="Content Placeholder 2">
             <a:extLst>
               <a:ext uri="{FF2B5EF4-FFF2-40B4-BE49-F238E27FC236}">
-                <a16:creationId xmlns:a16="http://schemas.microsoft.com/office/drawing/2014/main" xmlns="" id="{16E71D18-0184-8E49-B2DD-4AC61CABB8F7}"/>
+                <a16:creationId xmlns:a16="http://schemas.microsoft.com/office/drawing/2014/main" id="{16E71D18-0184-8E49-B2DD-4AC61CABB8F7}"/>
               </a:ext>
             </a:extLst>
           </p:cNvPr>
@@ -8702,7 +8737,7 @@
           <p:cNvPr id="2" name="Title 1">
             <a:extLst>
               <a:ext uri="{FF2B5EF4-FFF2-40B4-BE49-F238E27FC236}">
-                <a16:creationId xmlns:a16="http://schemas.microsoft.com/office/drawing/2014/main" xmlns="" id="{7F87B78A-232D-2847-A7AA-AFD7AA805FF4}"/>
+                <a16:creationId xmlns:a16="http://schemas.microsoft.com/office/drawing/2014/main" id="{7F87B78A-232D-2847-A7AA-AFD7AA805FF4}"/>
               </a:ext>
             </a:extLst>
           </p:cNvPr>
@@ -8730,7 +8765,7 @@
           <p:cNvPr id="3" name="Content Placeholder 2">
             <a:extLst>
               <a:ext uri="{FF2B5EF4-FFF2-40B4-BE49-F238E27FC236}">
-                <a16:creationId xmlns:a16="http://schemas.microsoft.com/office/drawing/2014/main" xmlns="" id="{87783A97-661D-C34A-A6B5-11F57DC14336}"/>
+                <a16:creationId xmlns:a16="http://schemas.microsoft.com/office/drawing/2014/main" id="{87783A97-661D-C34A-A6B5-11F57DC14336}"/>
               </a:ext>
             </a:extLst>
           </p:cNvPr>
@@ -8842,7 +8877,7 @@
           <p:cNvPr id="2" name="Title 1">
             <a:extLst>
               <a:ext uri="{FF2B5EF4-FFF2-40B4-BE49-F238E27FC236}">
-                <a16:creationId xmlns:a16="http://schemas.microsoft.com/office/drawing/2014/main" xmlns="" id="{7F87B78A-232D-2847-A7AA-AFD7AA805FF4}"/>
+                <a16:creationId xmlns:a16="http://schemas.microsoft.com/office/drawing/2014/main" id="{7F87B78A-232D-2847-A7AA-AFD7AA805FF4}"/>
               </a:ext>
             </a:extLst>
           </p:cNvPr>
@@ -8870,7 +8905,7 @@
           <p:cNvPr id="3" name="Content Placeholder 2">
             <a:extLst>
               <a:ext uri="{FF2B5EF4-FFF2-40B4-BE49-F238E27FC236}">
-                <a16:creationId xmlns:a16="http://schemas.microsoft.com/office/drawing/2014/main" xmlns="" id="{87783A97-661D-C34A-A6B5-11F57DC14336}"/>
+                <a16:creationId xmlns:a16="http://schemas.microsoft.com/office/drawing/2014/main" id="{87783A97-661D-C34A-A6B5-11F57DC14336}"/>
               </a:ext>
             </a:extLst>
           </p:cNvPr>
@@ -8940,7 +8975,7 @@
           <p:cNvPr id="2" name="Title 1">
             <a:extLst>
               <a:ext uri="{FF2B5EF4-FFF2-40B4-BE49-F238E27FC236}">
-                <a16:creationId xmlns:a16="http://schemas.microsoft.com/office/drawing/2014/main" xmlns="" id="{D45FBAD9-A6F8-2445-A34C-CB0DFE2F2A3E}"/>
+                <a16:creationId xmlns:a16="http://schemas.microsoft.com/office/drawing/2014/main" id="{D45FBAD9-A6F8-2445-A34C-CB0DFE2F2A3E}"/>
               </a:ext>
             </a:extLst>
           </p:cNvPr>
@@ -8968,7 +9003,7 @@
           <p:cNvPr id="3" name="Content Placeholder 2">
             <a:extLst>
               <a:ext uri="{FF2B5EF4-FFF2-40B4-BE49-F238E27FC236}">
-                <a16:creationId xmlns:a16="http://schemas.microsoft.com/office/drawing/2014/main" xmlns="" id="{E2A13F4D-2C12-9242-B657-F4F8E7140D18}"/>
+                <a16:creationId xmlns:a16="http://schemas.microsoft.com/office/drawing/2014/main" id="{E2A13F4D-2C12-9242-B657-F4F8E7140D18}"/>
               </a:ext>
             </a:extLst>
           </p:cNvPr>
@@ -9153,7 +9188,7 @@
           <p:cNvPr id="2" name="Title 1">
             <a:extLst>
               <a:ext uri="{FF2B5EF4-FFF2-40B4-BE49-F238E27FC236}">
-                <a16:creationId xmlns:a16="http://schemas.microsoft.com/office/drawing/2014/main" xmlns="" id="{6CCAD466-EE8C-0B4E-B0DF-08BF74C467A5}"/>
+                <a16:creationId xmlns:a16="http://schemas.microsoft.com/office/drawing/2014/main" id="{6CCAD466-EE8C-0B4E-B0DF-08BF74C467A5}"/>
               </a:ext>
             </a:extLst>
           </p:cNvPr>
@@ -9181,7 +9216,7 @@
           <p:cNvPr id="3" name="Content Placeholder 2">
             <a:extLst>
               <a:ext uri="{FF2B5EF4-FFF2-40B4-BE49-F238E27FC236}">
-                <a16:creationId xmlns:a16="http://schemas.microsoft.com/office/drawing/2014/main" xmlns="" id="{E1802F1D-6C4A-BA4F-AFEA-EF28322B2A17}"/>
+                <a16:creationId xmlns:a16="http://schemas.microsoft.com/office/drawing/2014/main" id="{E1802F1D-6C4A-BA4F-AFEA-EF28322B2A17}"/>
               </a:ext>
             </a:extLst>
           </p:cNvPr>

</xml_diff>